<commit_message>
new png photos from Greg Hildreth in repo and also added to presentation.
</commit_message>
<xml_diff>
--- a/FieldDataCollection.pptx
+++ b/FieldDataCollection.pptx
@@ -4,11 +4,16 @@
   <p:sldMasterIdLst>
     <p:sldMasterId id="2147483648" r:id="rId1"/>
   </p:sldMasterIdLst>
+  <p:notesMasterIdLst>
+    <p:notesMasterId r:id="rId8"/>
+  </p:notesMasterIdLst>
   <p:sldIdLst>
     <p:sldId id="256" r:id="rId2"/>
     <p:sldId id="258" r:id="rId3"/>
     <p:sldId id="257" r:id="rId4"/>
     <p:sldId id="259" r:id="rId5"/>
+    <p:sldId id="260" r:id="rId6"/>
+    <p:sldId id="261" r:id="rId7"/>
   </p:sldIdLst>
   <p:sldSz cx="12192000" cy="6858000"/>
   <p:notesSz cx="6858000" cy="9144000"/>
@@ -107,7 +112,658 @@
       </a:defRPr>
     </a:lvl9pPr>
   </p:defaultTextStyle>
+  <p:extLst>
+    <p:ext uri="{EFAFB233-063F-42B5-8137-9DF3F51BA10A}">
+      <p15:sldGuideLst xmlns:p15="http://schemas.microsoft.com/office/powerpoint/2012/main"/>
+    </p:ext>
+  </p:extLst>
 </p:presentation>
+</file>
+
+<file path=ppt/notesMasters/notesMaster1.xml><?xml version="1.0" encoding="utf-8"?>
+<p:notesMaster xmlns:a="http://schemas.openxmlformats.org/drawingml/2006/main" xmlns:r="http://schemas.openxmlformats.org/officeDocument/2006/relationships" xmlns:p="http://schemas.openxmlformats.org/presentationml/2006/main">
+  <p:cSld>
+    <p:bg>
+      <p:bgRef idx="1001">
+        <a:schemeClr val="bg1"/>
+      </p:bgRef>
+    </p:bg>
+    <p:spTree>
+      <p:nvGrpSpPr>
+        <p:cNvPr id="1" name=""/>
+        <p:cNvGrpSpPr/>
+        <p:nvPr/>
+      </p:nvGrpSpPr>
+      <p:grpSpPr>
+        <a:xfrm>
+          <a:off x="0" y="0"/>
+          <a:ext cx="0" cy="0"/>
+          <a:chOff x="0" y="0"/>
+          <a:chExt cx="0" cy="0"/>
+        </a:xfrm>
+      </p:grpSpPr>
+      <p:sp>
+        <p:nvSpPr>
+          <p:cNvPr id="2" name="Header Placeholder 1"/>
+          <p:cNvSpPr>
+            <a:spLocks noGrp="1"/>
+          </p:cNvSpPr>
+          <p:nvPr>
+            <p:ph type="hdr" sz="quarter"/>
+          </p:nvPr>
+        </p:nvSpPr>
+        <p:spPr>
+          <a:xfrm>
+            <a:off x="0" y="0"/>
+            <a:ext cx="2971800" cy="458788"/>
+          </a:xfrm>
+          <a:prstGeom prst="rect">
+            <a:avLst/>
+          </a:prstGeom>
+        </p:spPr>
+        <p:txBody>
+          <a:bodyPr vert="horz" lIns="91440" tIns="45720" rIns="91440" bIns="45720" rtlCol="0"/>
+          <a:lstStyle>
+            <a:lvl1pPr algn="l">
+              <a:defRPr sz="1200"/>
+            </a:lvl1pPr>
+          </a:lstStyle>
+          <a:p>
+            <a:endParaRPr lang="en-US"/>
+          </a:p>
+        </p:txBody>
+      </p:sp>
+      <p:sp>
+        <p:nvSpPr>
+          <p:cNvPr id="3" name="Date Placeholder 2"/>
+          <p:cNvSpPr>
+            <a:spLocks noGrp="1"/>
+          </p:cNvSpPr>
+          <p:nvPr>
+            <p:ph type="dt" idx="1"/>
+          </p:nvPr>
+        </p:nvSpPr>
+        <p:spPr>
+          <a:xfrm>
+            <a:off x="3884613" y="0"/>
+            <a:ext cx="2971800" cy="458788"/>
+          </a:xfrm>
+          <a:prstGeom prst="rect">
+            <a:avLst/>
+          </a:prstGeom>
+        </p:spPr>
+        <p:txBody>
+          <a:bodyPr vert="horz" lIns="91440" tIns="45720" rIns="91440" bIns="45720" rtlCol="0"/>
+          <a:lstStyle>
+            <a:lvl1pPr algn="r">
+              <a:defRPr sz="1200"/>
+            </a:lvl1pPr>
+          </a:lstStyle>
+          <a:p>
+            <a:fld id="{99A8F4B2-2777-4C7D-9190-24BE9C783CF1}" type="datetimeFigureOut">
+              <a:rPr lang="en-US" smtClean="0"/>
+              <a:t>11/22/2016</a:t>
+            </a:fld>
+            <a:endParaRPr lang="en-US"/>
+          </a:p>
+        </p:txBody>
+      </p:sp>
+      <p:sp>
+        <p:nvSpPr>
+          <p:cNvPr id="4" name="Slide Image Placeholder 3"/>
+          <p:cNvSpPr>
+            <a:spLocks noGrp="1" noRot="1" noChangeAspect="1"/>
+          </p:cNvSpPr>
+          <p:nvPr>
+            <p:ph type="sldImg" idx="2"/>
+          </p:nvPr>
+        </p:nvSpPr>
+        <p:spPr>
+          <a:xfrm>
+            <a:off x="685800" y="1143000"/>
+            <a:ext cx="5486400" cy="3086100"/>
+          </a:xfrm>
+          <a:prstGeom prst="rect">
+            <a:avLst/>
+          </a:prstGeom>
+          <a:noFill/>
+          <a:ln w="12700">
+            <a:solidFill>
+              <a:prstClr val="black"/>
+            </a:solidFill>
+          </a:ln>
+        </p:spPr>
+        <p:txBody>
+          <a:bodyPr vert="horz" lIns="91440" tIns="45720" rIns="91440" bIns="45720" rtlCol="0" anchor="ctr"/>
+          <a:lstStyle/>
+          <a:p>
+            <a:endParaRPr lang="en-US"/>
+          </a:p>
+        </p:txBody>
+      </p:sp>
+      <p:sp>
+        <p:nvSpPr>
+          <p:cNvPr id="5" name="Notes Placeholder 4"/>
+          <p:cNvSpPr>
+            <a:spLocks noGrp="1"/>
+          </p:cNvSpPr>
+          <p:nvPr>
+            <p:ph type="body" sz="quarter" idx="3"/>
+          </p:nvPr>
+        </p:nvSpPr>
+        <p:spPr>
+          <a:xfrm>
+            <a:off x="685800" y="4400550"/>
+            <a:ext cx="5486400" cy="3600450"/>
+          </a:xfrm>
+          <a:prstGeom prst="rect">
+            <a:avLst/>
+          </a:prstGeom>
+        </p:spPr>
+        <p:txBody>
+          <a:bodyPr vert="horz" lIns="91440" tIns="45720" rIns="91440" bIns="45720" rtlCol="0"/>
+          <a:lstStyle/>
+          <a:p>
+            <a:pPr lvl="0"/>
+            <a:r>
+              <a:rPr lang="en-US" smtClean="0"/>
+              <a:t>Click to edit Master text styles</a:t>
+            </a:r>
+          </a:p>
+          <a:p>
+            <a:pPr lvl="1"/>
+            <a:r>
+              <a:rPr lang="en-US" smtClean="0"/>
+              <a:t>Second level</a:t>
+            </a:r>
+          </a:p>
+          <a:p>
+            <a:pPr lvl="2"/>
+            <a:r>
+              <a:rPr lang="en-US" smtClean="0"/>
+              <a:t>Third level</a:t>
+            </a:r>
+          </a:p>
+          <a:p>
+            <a:pPr lvl="3"/>
+            <a:r>
+              <a:rPr lang="en-US" smtClean="0"/>
+              <a:t>Fourth level</a:t>
+            </a:r>
+          </a:p>
+          <a:p>
+            <a:pPr lvl="4"/>
+            <a:r>
+              <a:rPr lang="en-US" smtClean="0"/>
+              <a:t>Fifth level</a:t>
+            </a:r>
+            <a:endParaRPr lang="en-US"/>
+          </a:p>
+        </p:txBody>
+      </p:sp>
+      <p:sp>
+        <p:nvSpPr>
+          <p:cNvPr id="6" name="Footer Placeholder 5"/>
+          <p:cNvSpPr>
+            <a:spLocks noGrp="1"/>
+          </p:cNvSpPr>
+          <p:nvPr>
+            <p:ph type="ftr" sz="quarter" idx="4"/>
+          </p:nvPr>
+        </p:nvSpPr>
+        <p:spPr>
+          <a:xfrm>
+            <a:off x="0" y="8685213"/>
+            <a:ext cx="2971800" cy="458787"/>
+          </a:xfrm>
+          <a:prstGeom prst="rect">
+            <a:avLst/>
+          </a:prstGeom>
+        </p:spPr>
+        <p:txBody>
+          <a:bodyPr vert="horz" lIns="91440" tIns="45720" rIns="91440" bIns="45720" rtlCol="0" anchor="b"/>
+          <a:lstStyle>
+            <a:lvl1pPr algn="l">
+              <a:defRPr sz="1200"/>
+            </a:lvl1pPr>
+          </a:lstStyle>
+          <a:p>
+            <a:endParaRPr lang="en-US"/>
+          </a:p>
+        </p:txBody>
+      </p:sp>
+      <p:sp>
+        <p:nvSpPr>
+          <p:cNvPr id="7" name="Slide Number Placeholder 6"/>
+          <p:cNvSpPr>
+            <a:spLocks noGrp="1"/>
+          </p:cNvSpPr>
+          <p:nvPr>
+            <p:ph type="sldNum" sz="quarter" idx="5"/>
+          </p:nvPr>
+        </p:nvSpPr>
+        <p:spPr>
+          <a:xfrm>
+            <a:off x="3884613" y="8685213"/>
+            <a:ext cx="2971800" cy="458787"/>
+          </a:xfrm>
+          <a:prstGeom prst="rect">
+            <a:avLst/>
+          </a:prstGeom>
+        </p:spPr>
+        <p:txBody>
+          <a:bodyPr vert="horz" lIns="91440" tIns="45720" rIns="91440" bIns="45720" rtlCol="0" anchor="b"/>
+          <a:lstStyle>
+            <a:lvl1pPr algn="r">
+              <a:defRPr sz="1200"/>
+            </a:lvl1pPr>
+          </a:lstStyle>
+          <a:p>
+            <a:fld id="{D143731E-6EDF-4D96-A7BF-7B3718149DDF}" type="slidenum">
+              <a:rPr lang="en-US" smtClean="0"/>
+              <a:t>‹#›</a:t>
+            </a:fld>
+            <a:endParaRPr lang="en-US"/>
+          </a:p>
+        </p:txBody>
+      </p:sp>
+    </p:spTree>
+    <p:extLst>
+      <p:ext uri="{BB962C8B-B14F-4D97-AF65-F5344CB8AC3E}">
+        <p14:creationId xmlns:p14="http://schemas.microsoft.com/office/powerpoint/2010/main" val="1820596929"/>
+      </p:ext>
+    </p:extLst>
+  </p:cSld>
+  <p:clrMap bg1="lt1" tx1="dk1" bg2="lt2" tx2="dk2" accent1="accent1" accent2="accent2" accent3="accent3" accent4="accent4" accent5="accent5" accent6="accent6" hlink="hlink" folHlink="folHlink"/>
+  <p:notesStyle>
+    <a:lvl1pPr marL="0" algn="l" defTabSz="914400" rtl="0" eaLnBrk="1" latinLnBrk="0" hangingPunct="1">
+      <a:defRPr sz="1200" kern="1200">
+        <a:solidFill>
+          <a:schemeClr val="tx1"/>
+        </a:solidFill>
+        <a:latin typeface="+mn-lt"/>
+        <a:ea typeface="+mn-ea"/>
+        <a:cs typeface="+mn-cs"/>
+      </a:defRPr>
+    </a:lvl1pPr>
+    <a:lvl2pPr marL="457200" algn="l" defTabSz="914400" rtl="0" eaLnBrk="1" latinLnBrk="0" hangingPunct="1">
+      <a:defRPr sz="1200" kern="1200">
+        <a:solidFill>
+          <a:schemeClr val="tx1"/>
+        </a:solidFill>
+        <a:latin typeface="+mn-lt"/>
+        <a:ea typeface="+mn-ea"/>
+        <a:cs typeface="+mn-cs"/>
+      </a:defRPr>
+    </a:lvl2pPr>
+    <a:lvl3pPr marL="914400" algn="l" defTabSz="914400" rtl="0" eaLnBrk="1" latinLnBrk="0" hangingPunct="1">
+      <a:defRPr sz="1200" kern="1200">
+        <a:solidFill>
+          <a:schemeClr val="tx1"/>
+        </a:solidFill>
+        <a:latin typeface="+mn-lt"/>
+        <a:ea typeface="+mn-ea"/>
+        <a:cs typeface="+mn-cs"/>
+      </a:defRPr>
+    </a:lvl3pPr>
+    <a:lvl4pPr marL="1371600" algn="l" defTabSz="914400" rtl="0" eaLnBrk="1" latinLnBrk="0" hangingPunct="1">
+      <a:defRPr sz="1200" kern="1200">
+        <a:solidFill>
+          <a:schemeClr val="tx1"/>
+        </a:solidFill>
+        <a:latin typeface="+mn-lt"/>
+        <a:ea typeface="+mn-ea"/>
+        <a:cs typeface="+mn-cs"/>
+      </a:defRPr>
+    </a:lvl4pPr>
+    <a:lvl5pPr marL="1828800" algn="l" defTabSz="914400" rtl="0" eaLnBrk="1" latinLnBrk="0" hangingPunct="1">
+      <a:defRPr sz="1200" kern="1200">
+        <a:solidFill>
+          <a:schemeClr val="tx1"/>
+        </a:solidFill>
+        <a:latin typeface="+mn-lt"/>
+        <a:ea typeface="+mn-ea"/>
+        <a:cs typeface="+mn-cs"/>
+      </a:defRPr>
+    </a:lvl5pPr>
+    <a:lvl6pPr marL="2286000" algn="l" defTabSz="914400" rtl="0" eaLnBrk="1" latinLnBrk="0" hangingPunct="1">
+      <a:defRPr sz="1200" kern="1200">
+        <a:solidFill>
+          <a:schemeClr val="tx1"/>
+        </a:solidFill>
+        <a:latin typeface="+mn-lt"/>
+        <a:ea typeface="+mn-ea"/>
+        <a:cs typeface="+mn-cs"/>
+      </a:defRPr>
+    </a:lvl6pPr>
+    <a:lvl7pPr marL="2743200" algn="l" defTabSz="914400" rtl="0" eaLnBrk="1" latinLnBrk="0" hangingPunct="1">
+      <a:defRPr sz="1200" kern="1200">
+        <a:solidFill>
+          <a:schemeClr val="tx1"/>
+        </a:solidFill>
+        <a:latin typeface="+mn-lt"/>
+        <a:ea typeface="+mn-ea"/>
+        <a:cs typeface="+mn-cs"/>
+      </a:defRPr>
+    </a:lvl7pPr>
+    <a:lvl8pPr marL="3200400" algn="l" defTabSz="914400" rtl="0" eaLnBrk="1" latinLnBrk="0" hangingPunct="1">
+      <a:defRPr sz="1200" kern="1200">
+        <a:solidFill>
+          <a:schemeClr val="tx1"/>
+        </a:solidFill>
+        <a:latin typeface="+mn-lt"/>
+        <a:ea typeface="+mn-ea"/>
+        <a:cs typeface="+mn-cs"/>
+      </a:defRPr>
+    </a:lvl8pPr>
+    <a:lvl9pPr marL="3657600" algn="l" defTabSz="914400" rtl="0" eaLnBrk="1" latinLnBrk="0" hangingPunct="1">
+      <a:defRPr sz="1200" kern="1200">
+        <a:solidFill>
+          <a:schemeClr val="tx1"/>
+        </a:solidFill>
+        <a:latin typeface="+mn-lt"/>
+        <a:ea typeface="+mn-ea"/>
+        <a:cs typeface="+mn-cs"/>
+      </a:defRPr>
+    </a:lvl9pPr>
+  </p:notesStyle>
+</p:notesMaster>
+</file>
+
+<file path=ppt/notesSlides/notesSlide1.xml><?xml version="1.0" encoding="utf-8"?>
+<p:notes xmlns:a="http://schemas.openxmlformats.org/drawingml/2006/main" xmlns:r="http://schemas.openxmlformats.org/officeDocument/2006/relationships" xmlns:p="http://schemas.openxmlformats.org/presentationml/2006/main">
+  <p:cSld>
+    <p:spTree>
+      <p:nvGrpSpPr>
+        <p:cNvPr id="1" name=""/>
+        <p:cNvGrpSpPr/>
+        <p:nvPr/>
+      </p:nvGrpSpPr>
+      <p:grpSpPr>
+        <a:xfrm>
+          <a:off x="0" y="0"/>
+          <a:ext cx="0" cy="0"/>
+          <a:chOff x="0" y="0"/>
+          <a:chExt cx="0" cy="0"/>
+        </a:xfrm>
+      </p:grpSpPr>
+      <p:sp>
+        <p:nvSpPr>
+          <p:cNvPr id="2" name="Slide Image Placeholder 1"/>
+          <p:cNvSpPr>
+            <a:spLocks noGrp="1" noRot="1" noChangeAspect="1"/>
+          </p:cNvSpPr>
+          <p:nvPr>
+            <p:ph type="sldImg"/>
+          </p:nvPr>
+        </p:nvSpPr>
+        <p:spPr/>
+      </p:sp>
+      <p:sp>
+        <p:nvSpPr>
+          <p:cNvPr id="3" name="Notes Placeholder 2"/>
+          <p:cNvSpPr>
+            <a:spLocks noGrp="1"/>
+          </p:cNvSpPr>
+          <p:nvPr>
+            <p:ph type="body" idx="1"/>
+          </p:nvPr>
+        </p:nvSpPr>
+        <p:spPr/>
+        <p:txBody>
+          <a:bodyPr/>
+          <a:lstStyle/>
+          <a:p>
+            <a:r>
+              <a:rPr lang="en-US" dirty="0" smtClean="0"/>
+              <a:t>Target Audience =</a:t>
+            </a:r>
+            <a:r>
+              <a:rPr lang="en-US" baseline="0" dirty="0" smtClean="0"/>
+              <a:t> DPU (and Engineering) – Pat, Jay, Paul Harvey, Bobby? And Brian King.</a:t>
+            </a:r>
+            <a:endParaRPr lang="en-US" dirty="0"/>
+          </a:p>
+        </p:txBody>
+      </p:sp>
+      <p:sp>
+        <p:nvSpPr>
+          <p:cNvPr id="4" name="Slide Number Placeholder 3"/>
+          <p:cNvSpPr>
+            <a:spLocks noGrp="1"/>
+          </p:cNvSpPr>
+          <p:nvPr>
+            <p:ph type="sldNum" sz="quarter" idx="10"/>
+          </p:nvPr>
+        </p:nvSpPr>
+        <p:spPr/>
+        <p:txBody>
+          <a:bodyPr/>
+          <a:lstStyle/>
+          <a:p>
+            <a:fld id="{D143731E-6EDF-4D96-A7BF-7B3718149DDF}" type="slidenum">
+              <a:rPr lang="en-US" smtClean="0"/>
+              <a:t>1</a:t>
+            </a:fld>
+            <a:endParaRPr lang="en-US"/>
+          </a:p>
+        </p:txBody>
+      </p:sp>
+    </p:spTree>
+    <p:extLst>
+      <p:ext uri="{BB962C8B-B14F-4D97-AF65-F5344CB8AC3E}">
+        <p14:creationId xmlns:p14="http://schemas.microsoft.com/office/powerpoint/2010/main" val="2039331670"/>
+      </p:ext>
+    </p:extLst>
+  </p:cSld>
+  <p:clrMapOvr>
+    <a:masterClrMapping/>
+  </p:clrMapOvr>
+</p:notes>
+</file>
+
+<file path=ppt/notesSlides/notesSlide2.xml><?xml version="1.0" encoding="utf-8"?>
+<p:notes xmlns:a="http://schemas.openxmlformats.org/drawingml/2006/main" xmlns:r="http://schemas.openxmlformats.org/officeDocument/2006/relationships" xmlns:p="http://schemas.openxmlformats.org/presentationml/2006/main">
+  <p:cSld>
+    <p:spTree>
+      <p:nvGrpSpPr>
+        <p:cNvPr id="1" name=""/>
+        <p:cNvGrpSpPr/>
+        <p:nvPr/>
+      </p:nvGrpSpPr>
+      <p:grpSpPr>
+        <a:xfrm>
+          <a:off x="0" y="0"/>
+          <a:ext cx="0" cy="0"/>
+          <a:chOff x="0" y="0"/>
+          <a:chExt cx="0" cy="0"/>
+        </a:xfrm>
+      </p:grpSpPr>
+      <p:sp>
+        <p:nvSpPr>
+          <p:cNvPr id="2" name="Slide Image Placeholder 1"/>
+          <p:cNvSpPr>
+            <a:spLocks noGrp="1" noRot="1" noChangeAspect="1"/>
+          </p:cNvSpPr>
+          <p:nvPr>
+            <p:ph type="sldImg"/>
+          </p:nvPr>
+        </p:nvSpPr>
+        <p:spPr/>
+      </p:sp>
+      <p:sp>
+        <p:nvSpPr>
+          <p:cNvPr id="3" name="Notes Placeholder 2"/>
+          <p:cNvSpPr>
+            <a:spLocks noGrp="1"/>
+          </p:cNvSpPr>
+          <p:nvPr>
+            <p:ph type="body" idx="1"/>
+          </p:nvPr>
+        </p:nvSpPr>
+        <p:spPr/>
+        <p:txBody>
+          <a:bodyPr/>
+          <a:lstStyle/>
+          <a:p>
+            <a:r>
+              <a:rPr lang="en-US" sz="1200" kern="1200" dirty="0" smtClean="0">
+                <a:solidFill>
+                  <a:schemeClr val="tx1"/>
+                </a:solidFill>
+                <a:effectLst/>
+                <a:latin typeface="+mn-lt"/>
+                <a:ea typeface="+mn-ea"/>
+                <a:cs typeface="+mn-cs"/>
+              </a:rPr>
+              <a:t>One deals with home inspections/smoke testing associated with county sewer (2 screenshots attached) and the other logs animal control incidents.</a:t>
+            </a:r>
+            <a:endParaRPr lang="en-US" dirty="0"/>
+          </a:p>
+        </p:txBody>
+      </p:sp>
+      <p:sp>
+        <p:nvSpPr>
+          <p:cNvPr id="4" name="Slide Number Placeholder 3"/>
+          <p:cNvSpPr>
+            <a:spLocks noGrp="1"/>
+          </p:cNvSpPr>
+          <p:nvPr>
+            <p:ph type="sldNum" sz="quarter" idx="10"/>
+          </p:nvPr>
+        </p:nvSpPr>
+        <p:spPr/>
+        <p:txBody>
+          <a:bodyPr/>
+          <a:lstStyle/>
+          <a:p>
+            <a:fld id="{D143731E-6EDF-4D96-A7BF-7B3718149DDF}" type="slidenum">
+              <a:rPr lang="en-US" smtClean="0"/>
+              <a:t>5</a:t>
+            </a:fld>
+            <a:endParaRPr lang="en-US"/>
+          </a:p>
+        </p:txBody>
+      </p:sp>
+    </p:spTree>
+    <p:extLst>
+      <p:ext uri="{BB962C8B-B14F-4D97-AF65-F5344CB8AC3E}">
+        <p14:creationId xmlns:p14="http://schemas.microsoft.com/office/powerpoint/2010/main" val="1358648820"/>
+      </p:ext>
+    </p:extLst>
+  </p:cSld>
+  <p:clrMapOvr>
+    <a:masterClrMapping/>
+  </p:clrMapOvr>
+</p:notes>
+</file>
+
+<file path=ppt/notesSlides/notesSlide3.xml><?xml version="1.0" encoding="utf-8"?>
+<p:notes xmlns:a="http://schemas.openxmlformats.org/drawingml/2006/main" xmlns:r="http://schemas.openxmlformats.org/officeDocument/2006/relationships" xmlns:p="http://schemas.openxmlformats.org/presentationml/2006/main">
+  <p:cSld>
+    <p:spTree>
+      <p:nvGrpSpPr>
+        <p:cNvPr id="1" name=""/>
+        <p:cNvGrpSpPr/>
+        <p:nvPr/>
+      </p:nvGrpSpPr>
+      <p:grpSpPr>
+        <a:xfrm>
+          <a:off x="0" y="0"/>
+          <a:ext cx="0" cy="0"/>
+          <a:chOff x="0" y="0"/>
+          <a:chExt cx="0" cy="0"/>
+        </a:xfrm>
+      </p:grpSpPr>
+      <p:sp>
+        <p:nvSpPr>
+          <p:cNvPr id="2" name="Slide Image Placeholder 1"/>
+          <p:cNvSpPr>
+            <a:spLocks noGrp="1" noRot="1" noChangeAspect="1"/>
+          </p:cNvSpPr>
+          <p:nvPr>
+            <p:ph type="sldImg"/>
+          </p:nvPr>
+        </p:nvSpPr>
+        <p:spPr/>
+      </p:sp>
+      <p:sp>
+        <p:nvSpPr>
+          <p:cNvPr id="3" name="Notes Placeholder 2"/>
+          <p:cNvSpPr>
+            <a:spLocks noGrp="1"/>
+          </p:cNvSpPr>
+          <p:nvPr>
+            <p:ph type="body" idx="1"/>
+          </p:nvPr>
+        </p:nvSpPr>
+        <p:spPr/>
+        <p:txBody>
+          <a:bodyPr/>
+          <a:lstStyle/>
+          <a:p>
+            <a:r>
+              <a:rPr lang="en-US" sz="1200" kern="1200" dirty="0" smtClean="0">
+                <a:solidFill>
+                  <a:schemeClr val="tx1"/>
+                </a:solidFill>
+                <a:effectLst/>
+                <a:latin typeface="+mn-lt"/>
+                <a:ea typeface="+mn-ea"/>
+                <a:cs typeface="+mn-cs"/>
+              </a:rPr>
+              <a:t>They are also working on a Workforce</a:t>
+            </a:r>
+            <a:r>
+              <a:rPr lang="en-US" sz="1200" kern="1200" baseline="0" dirty="0" smtClean="0">
+                <a:solidFill>
+                  <a:schemeClr val="tx1"/>
+                </a:solidFill>
+                <a:effectLst/>
+                <a:latin typeface="+mn-lt"/>
+                <a:ea typeface="+mn-ea"/>
+                <a:cs typeface="+mn-cs"/>
+              </a:rPr>
+              <a:t> / Survey 123 application that would handle work orders.</a:t>
+            </a:r>
+            <a:endParaRPr lang="en-US" dirty="0"/>
+          </a:p>
+        </p:txBody>
+      </p:sp>
+      <p:sp>
+        <p:nvSpPr>
+          <p:cNvPr id="4" name="Slide Number Placeholder 3"/>
+          <p:cNvSpPr>
+            <a:spLocks noGrp="1"/>
+          </p:cNvSpPr>
+          <p:nvPr>
+            <p:ph type="sldNum" sz="quarter" idx="10"/>
+          </p:nvPr>
+        </p:nvSpPr>
+        <p:spPr/>
+        <p:txBody>
+          <a:bodyPr/>
+          <a:lstStyle/>
+          <a:p>
+            <a:fld id="{D143731E-6EDF-4D96-A7BF-7B3718149DDF}" type="slidenum">
+              <a:rPr lang="en-US" smtClean="0"/>
+              <a:t>6</a:t>
+            </a:fld>
+            <a:endParaRPr lang="en-US"/>
+          </a:p>
+        </p:txBody>
+      </p:sp>
+    </p:spTree>
+    <p:extLst>
+      <p:ext uri="{BB962C8B-B14F-4D97-AF65-F5344CB8AC3E}">
+        <p14:creationId xmlns:p14="http://schemas.microsoft.com/office/powerpoint/2010/main" val="1260465918"/>
+      </p:ext>
+    </p:extLst>
+  </p:cSld>
+  <p:clrMapOvr>
+    <a:masterClrMapping/>
+  </p:clrMapOvr>
+</p:notes>
 </file>
 
 <file path=ppt/slideLayouts/slideLayout1.xml><?xml version="1.0" encoding="utf-8"?>
@@ -340,7 +996,7 @@
             <a:fld id="{B61BEF0D-F0BB-DE4B-95CE-6DB70DBA9567}" type="datetimeFigureOut">
               <a:rPr lang="en-US" dirty="0"/>
               <a:pPr/>
-              <a:t>11/10/2016</a:t>
+              <a:t>11/22/2016</a:t>
             </a:fld>
             <a:endParaRPr lang="en-US" dirty="0"/>
           </a:p>
@@ -671,7 +1327,7 @@
             <a:fld id="{B61BEF0D-F0BB-DE4B-95CE-6DB70DBA9567}" type="datetimeFigureOut">
               <a:rPr lang="en-US" dirty="0"/>
               <a:pPr/>
-              <a:t>11/10/2016</a:t>
+              <a:t>11/22/2016</a:t>
             </a:fld>
             <a:endParaRPr lang="en-US" dirty="0"/>
           </a:p>
@@ -946,7 +1602,7 @@
             <a:fld id="{B61BEF0D-F0BB-DE4B-95CE-6DB70DBA9567}" type="datetimeFigureOut">
               <a:rPr lang="en-US" dirty="0"/>
               <a:pPr/>
-              <a:t>11/10/2016</a:t>
+              <a:t>11/22/2016</a:t>
             </a:fld>
             <a:endParaRPr lang="en-US" dirty="0"/>
           </a:p>
@@ -1511,7 +2167,7 @@
             <a:fld id="{B61BEF0D-F0BB-DE4B-95CE-6DB70DBA9567}" type="datetimeFigureOut">
               <a:rPr lang="en-US" dirty="0"/>
               <a:pPr/>
-              <a:t>11/10/2016</a:t>
+              <a:t>11/22/2016</a:t>
             </a:fld>
             <a:endParaRPr lang="en-US" dirty="0"/>
           </a:p>
@@ -1786,7 +2442,7 @@
             <a:fld id="{B61BEF0D-F0BB-DE4B-95CE-6DB70DBA9567}" type="datetimeFigureOut">
               <a:rPr lang="en-US" dirty="0"/>
               <a:pPr/>
-              <a:t>11/10/2016</a:t>
+              <a:t>11/22/2016</a:t>
             </a:fld>
             <a:endParaRPr lang="en-US" dirty="0"/>
           </a:p>
@@ -2345,7 +3001,7 @@
             <a:fld id="{B61BEF0D-F0BB-DE4B-95CE-6DB70DBA9567}" type="datetimeFigureOut">
               <a:rPr lang="en-US" dirty="0"/>
               <a:pPr/>
-              <a:t>11/10/2016</a:t>
+              <a:t>11/22/2016</a:t>
             </a:fld>
             <a:endParaRPr lang="en-US" dirty="0"/>
           </a:p>
@@ -2669,7 +3325,7 @@
             <a:fld id="{B61BEF0D-F0BB-DE4B-95CE-6DB70DBA9567}" type="datetimeFigureOut">
               <a:rPr lang="en-US" dirty="0"/>
               <a:pPr/>
-              <a:t>11/10/2016</a:t>
+              <a:t>11/22/2016</a:t>
             </a:fld>
             <a:endParaRPr lang="en-US" dirty="0"/>
           </a:p>
@@ -2843,7 +3499,7 @@
             <a:fld id="{B61BEF0D-F0BB-DE4B-95CE-6DB70DBA9567}" type="datetimeFigureOut">
               <a:rPr lang="en-US" dirty="0"/>
               <a:pPr/>
-              <a:t>11/10/2016</a:t>
+              <a:t>11/22/2016</a:t>
             </a:fld>
             <a:endParaRPr lang="en-US" dirty="0"/>
           </a:p>
@@ -3078,7 +3734,7 @@
             <a:fld id="{B61BEF0D-F0BB-DE4B-95CE-6DB70DBA9567}" type="datetimeFigureOut">
               <a:rPr lang="en-US" dirty="0"/>
               <a:pPr/>
-              <a:t>11/10/2016</a:t>
+              <a:t>11/22/2016</a:t>
             </a:fld>
             <a:endParaRPr lang="en-US" dirty="0"/>
           </a:p>
@@ -3275,7 +3931,7 @@
             <a:fld id="{B61BEF0D-F0BB-DE4B-95CE-6DB70DBA9567}" type="datetimeFigureOut">
               <a:rPr lang="en-US" dirty="0"/>
               <a:pPr/>
-              <a:t>11/10/2016</a:t>
+              <a:t>11/22/2016</a:t>
             </a:fld>
             <a:endParaRPr lang="en-US" dirty="0"/>
           </a:p>
@@ -3548,7 +4204,7 @@
             <a:fld id="{B61BEF0D-F0BB-DE4B-95CE-6DB70DBA9567}" type="datetimeFigureOut">
               <a:rPr lang="en-US" dirty="0"/>
               <a:pPr/>
-              <a:t>11/10/2016</a:t>
+              <a:t>11/22/2016</a:t>
             </a:fld>
             <a:endParaRPr lang="en-US" dirty="0"/>
           </a:p>
@@ -3811,7 +4467,7 @@
             <a:fld id="{B61BEF0D-F0BB-DE4B-95CE-6DB70DBA9567}" type="datetimeFigureOut">
               <a:rPr lang="en-US" dirty="0"/>
               <a:pPr/>
-              <a:t>11/10/2016</a:t>
+              <a:t>11/22/2016</a:t>
             </a:fld>
             <a:endParaRPr lang="en-US" dirty="0"/>
           </a:p>
@@ -4182,7 +4838,7 @@
             <a:fld id="{B61BEF0D-F0BB-DE4B-95CE-6DB70DBA9567}" type="datetimeFigureOut">
               <a:rPr lang="en-US" dirty="0"/>
               <a:pPr/>
-              <a:t>11/10/2016</a:t>
+              <a:t>11/22/2016</a:t>
             </a:fld>
             <a:endParaRPr lang="en-US" dirty="0"/>
           </a:p>
@@ -4327,7 +4983,7 @@
             <a:fld id="{B61BEF0D-F0BB-DE4B-95CE-6DB70DBA9567}" type="datetimeFigureOut">
               <a:rPr lang="en-US" dirty="0"/>
               <a:pPr/>
-              <a:t>11/10/2016</a:t>
+              <a:t>11/22/2016</a:t>
             </a:fld>
             <a:endParaRPr lang="en-US" dirty="0"/>
           </a:p>
@@ -4449,7 +5105,7 @@
             <a:fld id="{B61BEF0D-F0BB-DE4B-95CE-6DB70DBA9567}" type="datetimeFigureOut">
               <a:rPr lang="en-US" dirty="0"/>
               <a:pPr/>
-              <a:t>11/10/2016</a:t>
+              <a:t>11/22/2016</a:t>
             </a:fld>
             <a:endParaRPr lang="en-US" dirty="0"/>
           </a:p>
@@ -4731,7 +5387,7 @@
             <a:fld id="{B61BEF0D-F0BB-DE4B-95CE-6DB70DBA9567}" type="datetimeFigureOut">
               <a:rPr lang="en-US" dirty="0"/>
               <a:pPr/>
-              <a:t>11/10/2016</a:t>
+              <a:t>11/22/2016</a:t>
             </a:fld>
             <a:endParaRPr lang="en-US" dirty="0"/>
           </a:p>
@@ -5052,7 +5708,7 @@
             <a:fld id="{B61BEF0D-F0BB-DE4B-95CE-6DB70DBA9567}" type="datetimeFigureOut">
               <a:rPr lang="en-US" dirty="0"/>
               <a:pPr/>
-              <a:t>11/10/2016</a:t>
+              <a:t>11/22/2016</a:t>
             </a:fld>
             <a:endParaRPr lang="en-US" dirty="0"/>
           </a:p>
@@ -5263,7 +5919,7 @@
             <a:fld id="{B61BEF0D-F0BB-DE4B-95CE-6DB70DBA9567}" type="datetimeFigureOut">
               <a:rPr lang="en-US" dirty="0"/>
               <a:pPr/>
-              <a:t>11/10/2016</a:t>
+              <a:t>11/22/2016</a:t>
             </a:fld>
             <a:endParaRPr lang="en-US" dirty="0"/>
           </a:p>
@@ -6119,6 +6775,170 @@
 </p:sld>
 </file>
 
+<file path=ppt/slides/slide5.xml><?xml version="1.0" encoding="utf-8"?>
+<p:sld xmlns:a="http://schemas.openxmlformats.org/drawingml/2006/main" xmlns:r="http://schemas.openxmlformats.org/officeDocument/2006/relationships" xmlns:p="http://schemas.openxmlformats.org/presentationml/2006/main">
+  <p:cSld>
+    <p:spTree>
+      <p:nvGrpSpPr>
+        <p:cNvPr id="1" name=""/>
+        <p:cNvGrpSpPr/>
+        <p:nvPr/>
+      </p:nvGrpSpPr>
+      <p:grpSpPr>
+        <a:xfrm>
+          <a:off x="0" y="0"/>
+          <a:ext cx="0" cy="0"/>
+          <a:chOff x="0" y="0"/>
+          <a:chExt cx="0" cy="0"/>
+        </a:xfrm>
+      </p:grpSpPr>
+      <p:sp>
+        <p:nvSpPr>
+          <p:cNvPr id="2" name="Title 1"/>
+          <p:cNvSpPr>
+            <a:spLocks noGrp="1"/>
+          </p:cNvSpPr>
+          <p:nvPr>
+            <p:ph type="title"/>
+          </p:nvPr>
+        </p:nvSpPr>
+        <p:spPr/>
+        <p:txBody>
+          <a:bodyPr/>
+          <a:lstStyle/>
+          <a:p>
+            <a:r>
+              <a:rPr lang="en-US" dirty="0" smtClean="0"/>
+              <a:t>Allegany County – Home Inspections</a:t>
+            </a:r>
+            <a:endParaRPr lang="en-US" dirty="0"/>
+          </a:p>
+        </p:txBody>
+      </p:sp>
+      <p:pic>
+        <p:nvPicPr>
+          <p:cNvPr id="4" name="Content Placeholder 3"/>
+          <p:cNvPicPr>
+            <a:picLocks noGrp="1" noChangeAspect="1"/>
+          </p:cNvPicPr>
+          <p:nvPr>
+            <p:ph idx="1"/>
+          </p:nvPr>
+        </p:nvPicPr>
+        <p:blipFill>
+          <a:blip r:embed="rId3">
+            <a:extLst>
+              <a:ext uri="{28A0092B-C50C-407E-A947-70E740481C1C}">
+                <a14:useLocalDpi xmlns:a14="http://schemas.microsoft.com/office/drawing/2010/main" val="0"/>
+              </a:ext>
+            </a:extLst>
+          </a:blip>
+          <a:stretch>
+            <a:fillRect/>
+          </a:stretch>
+        </p:blipFill>
+        <p:spPr>
+          <a:xfrm>
+            <a:off x="2767364" y="1794630"/>
+            <a:ext cx="6324359" cy="4743269"/>
+          </a:xfrm>
+        </p:spPr>
+      </p:pic>
+    </p:spTree>
+    <p:extLst>
+      <p:ext uri="{BB962C8B-B14F-4D97-AF65-F5344CB8AC3E}">
+        <p14:creationId xmlns:p14="http://schemas.microsoft.com/office/powerpoint/2010/main" val="2994802026"/>
+      </p:ext>
+    </p:extLst>
+  </p:cSld>
+  <p:clrMapOvr>
+    <a:masterClrMapping/>
+  </p:clrMapOvr>
+</p:sld>
+</file>
+
+<file path=ppt/slides/slide6.xml><?xml version="1.0" encoding="utf-8"?>
+<p:sld xmlns:a="http://schemas.openxmlformats.org/drawingml/2006/main" xmlns:r="http://schemas.openxmlformats.org/officeDocument/2006/relationships" xmlns:p="http://schemas.openxmlformats.org/presentationml/2006/main">
+  <p:cSld>
+    <p:spTree>
+      <p:nvGrpSpPr>
+        <p:cNvPr id="1" name=""/>
+        <p:cNvGrpSpPr/>
+        <p:nvPr/>
+      </p:nvGrpSpPr>
+      <p:grpSpPr>
+        <a:xfrm>
+          <a:off x="0" y="0"/>
+          <a:ext cx="0" cy="0"/>
+          <a:chOff x="0" y="0"/>
+          <a:chExt cx="0" cy="0"/>
+        </a:xfrm>
+      </p:grpSpPr>
+      <p:sp>
+        <p:nvSpPr>
+          <p:cNvPr id="2" name="Title 1"/>
+          <p:cNvSpPr>
+            <a:spLocks noGrp="1"/>
+          </p:cNvSpPr>
+          <p:nvPr>
+            <p:ph type="title"/>
+          </p:nvPr>
+        </p:nvSpPr>
+        <p:spPr/>
+        <p:txBody>
+          <a:bodyPr/>
+          <a:lstStyle/>
+          <a:p>
+            <a:r>
+              <a:rPr lang="en-US" dirty="0" smtClean="0"/>
+              <a:t>Allegany County – Home Inspections</a:t>
+            </a:r>
+            <a:endParaRPr lang="en-US" dirty="0"/>
+          </a:p>
+        </p:txBody>
+      </p:sp>
+      <p:pic>
+        <p:nvPicPr>
+          <p:cNvPr id="4" name="Content Placeholder 3"/>
+          <p:cNvPicPr>
+            <a:picLocks noGrp="1" noChangeAspect="1"/>
+          </p:cNvPicPr>
+          <p:nvPr>
+            <p:ph idx="1"/>
+          </p:nvPr>
+        </p:nvPicPr>
+        <p:blipFill>
+          <a:blip r:embed="rId3">
+            <a:extLst>
+              <a:ext uri="{28A0092B-C50C-407E-A947-70E740481C1C}">
+                <a14:useLocalDpi xmlns:a14="http://schemas.microsoft.com/office/drawing/2010/main" val="0"/>
+              </a:ext>
+            </a:extLst>
+          </a:blip>
+          <a:stretch>
+            <a:fillRect/>
+          </a:stretch>
+        </p:blipFill>
+        <p:spPr>
+          <a:xfrm>
+            <a:off x="2767364" y="1794630"/>
+            <a:ext cx="6324358" cy="4743269"/>
+          </a:xfrm>
+        </p:spPr>
+      </p:pic>
+    </p:spTree>
+    <p:extLst>
+      <p:ext uri="{BB962C8B-B14F-4D97-AF65-F5344CB8AC3E}">
+        <p14:creationId xmlns:p14="http://schemas.microsoft.com/office/powerpoint/2010/main" val="1055084255"/>
+      </p:ext>
+    </p:extLst>
+  </p:cSld>
+  <p:clrMapOvr>
+    <a:masterClrMapping/>
+  </p:clrMapOvr>
+</p:sld>
+</file>
+
 <file path=ppt/theme/theme1.xml><?xml version="1.0" encoding="utf-8"?>
 <a:theme xmlns:a="http://schemas.openxmlformats.org/drawingml/2006/main" name="Celestial">
   <a:themeElements>
@@ -6366,4 +7186,265 @@
     </a:ext>
   </a:extLst>
 </a:theme>
+</file>
+
+<file path=ppt/theme/theme2.xml><?xml version="1.0" encoding="utf-8"?>
+<a:theme xmlns:a="http://schemas.openxmlformats.org/drawingml/2006/main" name="Office Theme">
+  <a:themeElements>
+    <a:clrScheme name="Office">
+      <a:dk1>
+        <a:sysClr val="windowText" lastClr="000000"/>
+      </a:dk1>
+      <a:lt1>
+        <a:sysClr val="window" lastClr="FFFFFF"/>
+      </a:lt1>
+      <a:dk2>
+        <a:srgbClr val="44546A"/>
+      </a:dk2>
+      <a:lt2>
+        <a:srgbClr val="E7E6E6"/>
+      </a:lt2>
+      <a:accent1>
+        <a:srgbClr val="5B9BD5"/>
+      </a:accent1>
+      <a:accent2>
+        <a:srgbClr val="ED7D31"/>
+      </a:accent2>
+      <a:accent3>
+        <a:srgbClr val="A5A5A5"/>
+      </a:accent3>
+      <a:accent4>
+        <a:srgbClr val="FFC000"/>
+      </a:accent4>
+      <a:accent5>
+        <a:srgbClr val="4472C4"/>
+      </a:accent5>
+      <a:accent6>
+        <a:srgbClr val="70AD47"/>
+      </a:accent6>
+      <a:hlink>
+        <a:srgbClr val="0563C1"/>
+      </a:hlink>
+      <a:folHlink>
+        <a:srgbClr val="954F72"/>
+      </a:folHlink>
+    </a:clrScheme>
+    <a:fontScheme name="Office">
+      <a:majorFont>
+        <a:latin typeface="Calibri Light" panose="020F0302020204030204"/>
+        <a:ea typeface=""/>
+        <a:cs typeface=""/>
+        <a:font script="Jpan" typeface="ＭＳ Ｐゴシック"/>
+        <a:font script="Hang" typeface="맑은 고딕"/>
+        <a:font script="Hans" typeface="宋体"/>
+        <a:font script="Hant" typeface="新細明體"/>
+        <a:font script="Arab" typeface="Times New Roman"/>
+        <a:font script="Hebr" typeface="Times New Roman"/>
+        <a:font script="Thai" typeface="Angsana New"/>
+        <a:font script="Ethi" typeface="Nyala"/>
+        <a:font script="Beng" typeface="Vrinda"/>
+        <a:font script="Gujr" typeface="Shruti"/>
+        <a:font script="Khmr" typeface="MoolBoran"/>
+        <a:font script="Knda" typeface="Tunga"/>
+        <a:font script="Guru" typeface="Raavi"/>
+        <a:font script="Cans" typeface="Euphemia"/>
+        <a:font script="Cher" typeface="Plantagenet Cherokee"/>
+        <a:font script="Yiii" typeface="Microsoft Yi Baiti"/>
+        <a:font script="Tibt" typeface="Microsoft Himalaya"/>
+        <a:font script="Thaa" typeface="MV Boli"/>
+        <a:font script="Deva" typeface="Mangal"/>
+        <a:font script="Telu" typeface="Gautami"/>
+        <a:font script="Taml" typeface="Latha"/>
+        <a:font script="Syrc" typeface="Estrangelo Edessa"/>
+        <a:font script="Orya" typeface="Kalinga"/>
+        <a:font script="Mlym" typeface="Kartika"/>
+        <a:font script="Laoo" typeface="DokChampa"/>
+        <a:font script="Sinh" typeface="Iskoola Pota"/>
+        <a:font script="Mong" typeface="Mongolian Baiti"/>
+        <a:font script="Viet" typeface="Times New Roman"/>
+        <a:font script="Uigh" typeface="Microsoft Uighur"/>
+        <a:font script="Geor" typeface="Sylfaen"/>
+      </a:majorFont>
+      <a:minorFont>
+        <a:latin typeface="Calibri" panose="020F0502020204030204"/>
+        <a:ea typeface=""/>
+        <a:cs typeface=""/>
+        <a:font script="Jpan" typeface="ＭＳ Ｐゴシック"/>
+        <a:font script="Hang" typeface="맑은 고딕"/>
+        <a:font script="Hans" typeface="宋体"/>
+        <a:font script="Hant" typeface="新細明體"/>
+        <a:font script="Arab" typeface="Arial"/>
+        <a:font script="Hebr" typeface="Arial"/>
+        <a:font script="Thai" typeface="Cordia New"/>
+        <a:font script="Ethi" typeface="Nyala"/>
+        <a:font script="Beng" typeface="Vrinda"/>
+        <a:font script="Gujr" typeface="Shruti"/>
+        <a:font script="Khmr" typeface="DaunPenh"/>
+        <a:font script="Knda" typeface="Tunga"/>
+        <a:font script="Guru" typeface="Raavi"/>
+        <a:font script="Cans" typeface="Euphemia"/>
+        <a:font script="Cher" typeface="Plantagenet Cherokee"/>
+        <a:font script="Yiii" typeface="Microsoft Yi Baiti"/>
+        <a:font script="Tibt" typeface="Microsoft Himalaya"/>
+        <a:font script="Thaa" typeface="MV Boli"/>
+        <a:font script="Deva" typeface="Mangal"/>
+        <a:font script="Telu" typeface="Gautami"/>
+        <a:font script="Taml" typeface="Latha"/>
+        <a:font script="Syrc" typeface="Estrangelo Edessa"/>
+        <a:font script="Orya" typeface="Kalinga"/>
+        <a:font script="Mlym" typeface="Kartika"/>
+        <a:font script="Laoo" typeface="DokChampa"/>
+        <a:font script="Sinh" typeface="Iskoola Pota"/>
+        <a:font script="Mong" typeface="Mongolian Baiti"/>
+        <a:font script="Viet" typeface="Arial"/>
+        <a:font script="Uigh" typeface="Microsoft Uighur"/>
+        <a:font script="Geor" typeface="Sylfaen"/>
+      </a:minorFont>
+    </a:fontScheme>
+    <a:fmtScheme name="Office">
+      <a:fillStyleLst>
+        <a:solidFill>
+          <a:schemeClr val="phClr"/>
+        </a:solidFill>
+        <a:gradFill rotWithShape="1">
+          <a:gsLst>
+            <a:gs pos="0">
+              <a:schemeClr val="phClr">
+                <a:lumMod val="110000"/>
+                <a:satMod val="105000"/>
+                <a:tint val="67000"/>
+              </a:schemeClr>
+            </a:gs>
+            <a:gs pos="50000">
+              <a:schemeClr val="phClr">
+                <a:lumMod val="105000"/>
+                <a:satMod val="103000"/>
+                <a:tint val="73000"/>
+              </a:schemeClr>
+            </a:gs>
+            <a:gs pos="100000">
+              <a:schemeClr val="phClr">
+                <a:lumMod val="105000"/>
+                <a:satMod val="109000"/>
+                <a:tint val="81000"/>
+              </a:schemeClr>
+            </a:gs>
+          </a:gsLst>
+          <a:lin ang="5400000" scaled="0"/>
+        </a:gradFill>
+        <a:gradFill rotWithShape="1">
+          <a:gsLst>
+            <a:gs pos="0">
+              <a:schemeClr val="phClr">
+                <a:satMod val="103000"/>
+                <a:lumMod val="102000"/>
+                <a:tint val="94000"/>
+              </a:schemeClr>
+            </a:gs>
+            <a:gs pos="50000">
+              <a:schemeClr val="phClr">
+                <a:satMod val="110000"/>
+                <a:lumMod val="100000"/>
+                <a:shade val="100000"/>
+              </a:schemeClr>
+            </a:gs>
+            <a:gs pos="100000">
+              <a:schemeClr val="phClr">
+                <a:lumMod val="99000"/>
+                <a:satMod val="120000"/>
+                <a:shade val="78000"/>
+              </a:schemeClr>
+            </a:gs>
+          </a:gsLst>
+          <a:lin ang="5400000" scaled="0"/>
+        </a:gradFill>
+      </a:fillStyleLst>
+      <a:lnStyleLst>
+        <a:ln w="6350" cap="flat" cmpd="sng" algn="ctr">
+          <a:solidFill>
+            <a:schemeClr val="phClr"/>
+          </a:solidFill>
+          <a:prstDash val="solid"/>
+          <a:miter lim="800000"/>
+        </a:ln>
+        <a:ln w="12700" cap="flat" cmpd="sng" algn="ctr">
+          <a:solidFill>
+            <a:schemeClr val="phClr"/>
+          </a:solidFill>
+          <a:prstDash val="solid"/>
+          <a:miter lim="800000"/>
+        </a:ln>
+        <a:ln w="19050" cap="flat" cmpd="sng" algn="ctr">
+          <a:solidFill>
+            <a:schemeClr val="phClr"/>
+          </a:solidFill>
+          <a:prstDash val="solid"/>
+          <a:miter lim="800000"/>
+        </a:ln>
+      </a:lnStyleLst>
+      <a:effectStyleLst>
+        <a:effectStyle>
+          <a:effectLst/>
+        </a:effectStyle>
+        <a:effectStyle>
+          <a:effectLst/>
+        </a:effectStyle>
+        <a:effectStyle>
+          <a:effectLst>
+            <a:outerShdw blurRad="57150" dist="19050" dir="5400000" algn="ctr" rotWithShape="0">
+              <a:srgbClr val="000000">
+                <a:alpha val="63000"/>
+              </a:srgbClr>
+            </a:outerShdw>
+          </a:effectLst>
+        </a:effectStyle>
+      </a:effectStyleLst>
+      <a:bgFillStyleLst>
+        <a:solidFill>
+          <a:schemeClr val="phClr"/>
+        </a:solidFill>
+        <a:solidFill>
+          <a:schemeClr val="phClr">
+            <a:tint val="95000"/>
+            <a:satMod val="170000"/>
+          </a:schemeClr>
+        </a:solidFill>
+        <a:gradFill rotWithShape="1">
+          <a:gsLst>
+            <a:gs pos="0">
+              <a:schemeClr val="phClr">
+                <a:tint val="93000"/>
+                <a:satMod val="150000"/>
+                <a:shade val="98000"/>
+                <a:lumMod val="102000"/>
+              </a:schemeClr>
+            </a:gs>
+            <a:gs pos="50000">
+              <a:schemeClr val="phClr">
+                <a:tint val="98000"/>
+                <a:satMod val="130000"/>
+                <a:shade val="90000"/>
+                <a:lumMod val="103000"/>
+              </a:schemeClr>
+            </a:gs>
+            <a:gs pos="100000">
+              <a:schemeClr val="phClr">
+                <a:shade val="63000"/>
+                <a:satMod val="120000"/>
+              </a:schemeClr>
+            </a:gs>
+          </a:gsLst>
+          <a:lin ang="5400000" scaled="0"/>
+        </a:gradFill>
+      </a:bgFillStyleLst>
+    </a:fmtScheme>
+  </a:themeElements>
+  <a:objectDefaults/>
+  <a:extraClrSchemeLst/>
+  <a:extLst>
+    <a:ext uri="{05A4C25C-085E-4340-85A3-A5531E510DB2}">
+      <thm15:themeFamily xmlns:thm15="http://schemas.microsoft.com/office/thememl/2012/main" name="Office Theme" id="{62F939B6-93AF-4DB8-9C6B-D6C7DFDC589F}" vid="{4A3C46E8-61CC-4603-A589-7422A47A8E4A}"/>
+    </a:ext>
+  </a:extLst>
+</a:theme>
 </file>
</xml_diff>

<commit_message>
have new (unused) JPGs showing Workforce and edits to the pptx.
</commit_message>
<xml_diff>
--- a/FieldDataCollection.pptx
+++ b/FieldDataCollection.pptx
@@ -5,15 +5,17 @@
     <p:sldMasterId id="2147483648" r:id="rId1"/>
   </p:sldMasterIdLst>
   <p:notesMasterIdLst>
-    <p:notesMasterId r:id="rId8"/>
+    <p:notesMasterId r:id="rId10"/>
   </p:notesMasterIdLst>
   <p:sldIdLst>
     <p:sldId id="256" r:id="rId2"/>
     <p:sldId id="258" r:id="rId3"/>
-    <p:sldId id="257" r:id="rId4"/>
-    <p:sldId id="259" r:id="rId5"/>
-    <p:sldId id="260" r:id="rId6"/>
-    <p:sldId id="261" r:id="rId7"/>
+    <p:sldId id="262" r:id="rId4"/>
+    <p:sldId id="264" r:id="rId5"/>
+    <p:sldId id="263" r:id="rId6"/>
+    <p:sldId id="260" r:id="rId7"/>
+    <p:sldId id="261" r:id="rId8"/>
+    <p:sldId id="257" r:id="rId9"/>
   </p:sldIdLst>
   <p:sldSz cx="12192000" cy="6858000"/>
   <p:notesSz cx="6858000" cy="9144000"/>
@@ -202,7 +204,7 @@
           <a:p>
             <a:fld id="{99A8F4B2-2777-4C7D-9190-24BE9C783CF1}" type="datetimeFigureOut">
               <a:rPr lang="en-US" smtClean="0"/>
-              <a:t>11/22/2016</a:t>
+              <a:t>11/23/2016</a:t>
             </a:fld>
             <a:endParaRPr lang="en-US"/>
           </a:p>
@@ -607,16 +609,18 @@
           <a:lstStyle/>
           <a:p>
             <a:r>
-              <a:rPr lang="en-US" sz="1200" kern="1200" dirty="0" smtClean="0">
-                <a:solidFill>
-                  <a:schemeClr val="tx1"/>
-                </a:solidFill>
-                <a:effectLst/>
-                <a:latin typeface="+mn-lt"/>
-                <a:ea typeface="+mn-ea"/>
-                <a:cs typeface="+mn-cs"/>
-              </a:rPr>
-              <a:t>One deals with home inspections/smoke testing associated with county sewer (2 screenshots attached) and the other logs animal control incidents.</a:t>
+              <a:rPr lang="en-US" dirty="0" smtClean="0"/>
+              <a:t>AGOL</a:t>
+            </a:r>
+            <a:r>
+              <a:rPr lang="en-US" baseline="0" dirty="0" smtClean="0"/>
+              <a:t> is great! because it is very easy to whip something up in no time flat. Then they can be used on mobile devices. It is the licensing that is restrictive.</a:t>
+            </a:r>
+          </a:p>
+          <a:p>
+            <a:r>
+              <a:rPr lang="en-US" baseline="0" dirty="0" smtClean="0"/>
+              <a:t>We have five user accounts because we have five desktop licenses.</a:t>
             </a:r>
             <a:endParaRPr lang="en-US" dirty="0"/>
           </a:p>
@@ -639,7 +643,7 @@
           <a:p>
             <a:fld id="{D143731E-6EDF-4D96-A7BF-7B3718149DDF}" type="slidenum">
               <a:rPr lang="en-US" smtClean="0"/>
-              <a:t>5</a:t>
+              <a:t>2</a:t>
             </a:fld>
             <a:endParaRPr lang="en-US"/>
           </a:p>
@@ -648,7 +652,7 @@
     </p:spTree>
     <p:extLst>
       <p:ext uri="{BB962C8B-B14F-4D97-AF65-F5344CB8AC3E}">
-        <p14:creationId xmlns:p14="http://schemas.microsoft.com/office/powerpoint/2010/main" val="1358648820"/>
+        <p14:creationId xmlns:p14="http://schemas.microsoft.com/office/powerpoint/2010/main" val="2547350077"/>
       </p:ext>
     </p:extLst>
   </p:cSld>
@@ -703,6 +707,454 @@
           <a:lstStyle/>
           <a:p>
             <a:r>
+              <a:rPr lang="en-US" dirty="0" smtClean="0"/>
+              <a:t>At $500</a:t>
+            </a:r>
+            <a:r>
+              <a:rPr lang="en-US" baseline="0" dirty="0" smtClean="0"/>
+              <a:t> a pop (per user/per year) and a minimum of 5 additional users, it is a little bit restrictive.</a:t>
+            </a:r>
+            <a:endParaRPr lang="en-US" dirty="0"/>
+          </a:p>
+        </p:txBody>
+      </p:sp>
+      <p:sp>
+        <p:nvSpPr>
+          <p:cNvPr id="4" name="Slide Number Placeholder 3"/>
+          <p:cNvSpPr>
+            <a:spLocks noGrp="1"/>
+          </p:cNvSpPr>
+          <p:nvPr>
+            <p:ph type="sldNum" sz="quarter" idx="10"/>
+          </p:nvPr>
+        </p:nvSpPr>
+        <p:spPr/>
+        <p:txBody>
+          <a:bodyPr/>
+          <a:lstStyle/>
+          <a:p>
+            <a:fld id="{D143731E-6EDF-4D96-A7BF-7B3718149DDF}" type="slidenum">
+              <a:rPr lang="en-US" smtClean="0"/>
+              <a:t>3</a:t>
+            </a:fld>
+            <a:endParaRPr lang="en-US"/>
+          </a:p>
+        </p:txBody>
+      </p:sp>
+    </p:spTree>
+    <p:extLst>
+      <p:ext uri="{BB962C8B-B14F-4D97-AF65-F5344CB8AC3E}">
+        <p14:creationId xmlns:p14="http://schemas.microsoft.com/office/powerpoint/2010/main" val="3133497823"/>
+      </p:ext>
+    </p:extLst>
+  </p:cSld>
+  <p:clrMapOvr>
+    <a:masterClrMapping/>
+  </p:clrMapOvr>
+</p:notes>
+</file>
+
+<file path=ppt/notesSlides/notesSlide4.xml><?xml version="1.0" encoding="utf-8"?>
+<p:notes xmlns:a="http://schemas.openxmlformats.org/drawingml/2006/main" xmlns:r="http://schemas.openxmlformats.org/officeDocument/2006/relationships" xmlns:p="http://schemas.openxmlformats.org/presentationml/2006/main">
+  <p:cSld>
+    <p:spTree>
+      <p:nvGrpSpPr>
+        <p:cNvPr id="1" name=""/>
+        <p:cNvGrpSpPr/>
+        <p:nvPr/>
+      </p:nvGrpSpPr>
+      <p:grpSpPr>
+        <a:xfrm>
+          <a:off x="0" y="0"/>
+          <a:ext cx="0" cy="0"/>
+          <a:chOff x="0" y="0"/>
+          <a:chExt cx="0" cy="0"/>
+        </a:xfrm>
+      </p:grpSpPr>
+      <p:sp>
+        <p:nvSpPr>
+          <p:cNvPr id="2" name="Slide Image Placeholder 1"/>
+          <p:cNvSpPr>
+            <a:spLocks noGrp="1" noRot="1" noChangeAspect="1"/>
+          </p:cNvSpPr>
+          <p:nvPr>
+            <p:ph type="sldImg"/>
+          </p:nvPr>
+        </p:nvSpPr>
+        <p:spPr/>
+      </p:sp>
+      <p:sp>
+        <p:nvSpPr>
+          <p:cNvPr id="3" name="Notes Placeholder 2"/>
+          <p:cNvSpPr>
+            <a:spLocks noGrp="1"/>
+          </p:cNvSpPr>
+          <p:nvPr>
+            <p:ph type="body" idx="1"/>
+          </p:nvPr>
+        </p:nvSpPr>
+        <p:spPr/>
+        <p:txBody>
+          <a:bodyPr/>
+          <a:lstStyle/>
+          <a:p>
+            <a:r>
+              <a:rPr lang="en-US" dirty="0" smtClean="0"/>
+              <a:t>So ESRI has several different flavors of Apps to use with the maps made through AGOL and AGS. </a:t>
+            </a:r>
+          </a:p>
+          <a:p>
+            <a:r>
+              <a:rPr lang="en-US" dirty="0" smtClean="0"/>
+              <a:t>Collector - Allows you to create</a:t>
+            </a:r>
+            <a:r>
+              <a:rPr lang="en-US" baseline="0" dirty="0" smtClean="0"/>
+              <a:t> features with full editing capabilities (Damage Assessment application demo??). The latest versions allow you to use Survey Grade GPS data collection but hardware compatibility needs to be explored.</a:t>
+            </a:r>
+          </a:p>
+          <a:p>
+            <a:r>
+              <a:rPr lang="en-US" baseline="0" dirty="0" smtClean="0"/>
+              <a:t>Workforce – This is a very basic Work Order Management System</a:t>
+            </a:r>
+          </a:p>
+          <a:p>
+            <a:r>
+              <a:rPr lang="en-US" baseline="0" dirty="0" smtClean="0"/>
+              <a:t>Survey 1, 2, 3 – This has nothing to do with Land Surveying. You fill out a spreadsheet with questions and it creates a form that gets filled out in the app.</a:t>
+            </a:r>
+          </a:p>
+          <a:p>
+            <a:r>
+              <a:rPr lang="en-US" baseline="0" dirty="0" smtClean="0"/>
+              <a:t>App Studio – Allows all sorts of custom applications (this is an area of interest of mine). You can do </a:t>
+            </a:r>
+            <a:r>
+              <a:rPr lang="en-US" baseline="0" dirty="0" err="1" smtClean="0"/>
+              <a:t>GeoSpatial</a:t>
+            </a:r>
+            <a:r>
+              <a:rPr lang="en-US" baseline="0" dirty="0" smtClean="0"/>
+              <a:t> Analysis involving buffers and routing etc.</a:t>
+            </a:r>
+            <a:endParaRPr lang="en-US" dirty="0"/>
+          </a:p>
+        </p:txBody>
+      </p:sp>
+      <p:sp>
+        <p:nvSpPr>
+          <p:cNvPr id="4" name="Slide Number Placeholder 3"/>
+          <p:cNvSpPr>
+            <a:spLocks noGrp="1"/>
+          </p:cNvSpPr>
+          <p:nvPr>
+            <p:ph type="sldNum" sz="quarter" idx="10"/>
+          </p:nvPr>
+        </p:nvSpPr>
+        <p:spPr/>
+        <p:txBody>
+          <a:bodyPr/>
+          <a:lstStyle/>
+          <a:p>
+            <a:fld id="{D143731E-6EDF-4D96-A7BF-7B3718149DDF}" type="slidenum">
+              <a:rPr lang="en-US" smtClean="0"/>
+              <a:t>4</a:t>
+            </a:fld>
+            <a:endParaRPr lang="en-US"/>
+          </a:p>
+        </p:txBody>
+      </p:sp>
+    </p:spTree>
+    <p:extLst>
+      <p:ext uri="{BB962C8B-B14F-4D97-AF65-F5344CB8AC3E}">
+        <p14:creationId xmlns:p14="http://schemas.microsoft.com/office/powerpoint/2010/main" val="3871354025"/>
+      </p:ext>
+    </p:extLst>
+  </p:cSld>
+  <p:clrMapOvr>
+    <a:masterClrMapping/>
+  </p:clrMapOvr>
+</p:notes>
+</file>
+
+<file path=ppt/notesSlides/notesSlide5.xml><?xml version="1.0" encoding="utf-8"?>
+<p:notes xmlns:a="http://schemas.openxmlformats.org/drawingml/2006/main" xmlns:r="http://schemas.openxmlformats.org/officeDocument/2006/relationships" xmlns:p="http://schemas.openxmlformats.org/presentationml/2006/main">
+  <p:cSld>
+    <p:spTree>
+      <p:nvGrpSpPr>
+        <p:cNvPr id="1" name=""/>
+        <p:cNvGrpSpPr/>
+        <p:nvPr/>
+      </p:nvGrpSpPr>
+      <p:grpSpPr>
+        <a:xfrm>
+          <a:off x="0" y="0"/>
+          <a:ext cx="0" cy="0"/>
+          <a:chOff x="0" y="0"/>
+          <a:chExt cx="0" cy="0"/>
+        </a:xfrm>
+      </p:grpSpPr>
+      <p:sp>
+        <p:nvSpPr>
+          <p:cNvPr id="2" name="Slide Image Placeholder 1"/>
+          <p:cNvSpPr>
+            <a:spLocks noGrp="1" noRot="1" noChangeAspect="1"/>
+          </p:cNvSpPr>
+          <p:nvPr>
+            <p:ph type="sldImg"/>
+          </p:nvPr>
+        </p:nvSpPr>
+        <p:spPr/>
+      </p:sp>
+      <p:sp>
+        <p:nvSpPr>
+          <p:cNvPr id="3" name="Notes Placeholder 2"/>
+          <p:cNvSpPr>
+            <a:spLocks noGrp="1"/>
+          </p:cNvSpPr>
+          <p:nvPr>
+            <p:ph type="body" idx="1"/>
+          </p:nvPr>
+        </p:nvSpPr>
+        <p:spPr/>
+        <p:txBody>
+          <a:bodyPr/>
+          <a:lstStyle/>
+          <a:p>
+            <a:r>
+              <a:rPr lang="en-US" dirty="0" smtClean="0"/>
+              <a:t>PG County has a dashboard for their supervisor(s)</a:t>
+            </a:r>
+            <a:r>
+              <a:rPr lang="en-US" baseline="0" dirty="0" smtClean="0"/>
+              <a:t> to see where work has been started and where it has been completed. They used Collector but that was probably done before Workforce existed.</a:t>
+            </a:r>
+          </a:p>
+          <a:p>
+            <a:r>
+              <a:rPr lang="en-US" baseline="0" dirty="0" smtClean="0"/>
+              <a:t>They also used a mobile application to eliminate paperwork for Liquor Board Inspections.</a:t>
+            </a:r>
+            <a:endParaRPr lang="en-US" dirty="0"/>
+          </a:p>
+        </p:txBody>
+      </p:sp>
+      <p:sp>
+        <p:nvSpPr>
+          <p:cNvPr id="4" name="Slide Number Placeholder 3"/>
+          <p:cNvSpPr>
+            <a:spLocks noGrp="1"/>
+          </p:cNvSpPr>
+          <p:nvPr>
+            <p:ph type="sldNum" sz="quarter" idx="10"/>
+          </p:nvPr>
+        </p:nvSpPr>
+        <p:spPr/>
+        <p:txBody>
+          <a:bodyPr/>
+          <a:lstStyle/>
+          <a:p>
+            <a:fld id="{D143731E-6EDF-4D96-A7BF-7B3718149DDF}" type="slidenum">
+              <a:rPr lang="en-US" smtClean="0"/>
+              <a:t>5</a:t>
+            </a:fld>
+            <a:endParaRPr lang="en-US"/>
+          </a:p>
+        </p:txBody>
+      </p:sp>
+    </p:spTree>
+    <p:extLst>
+      <p:ext uri="{BB962C8B-B14F-4D97-AF65-F5344CB8AC3E}">
+        <p14:creationId xmlns:p14="http://schemas.microsoft.com/office/powerpoint/2010/main" val="3061651821"/>
+      </p:ext>
+    </p:extLst>
+  </p:cSld>
+  <p:clrMapOvr>
+    <a:masterClrMapping/>
+  </p:clrMapOvr>
+</p:notes>
+</file>
+
+<file path=ppt/notesSlides/notesSlide6.xml><?xml version="1.0" encoding="utf-8"?>
+<p:notes xmlns:a="http://schemas.openxmlformats.org/drawingml/2006/main" xmlns:r="http://schemas.openxmlformats.org/officeDocument/2006/relationships" xmlns:p="http://schemas.openxmlformats.org/presentationml/2006/main">
+  <p:cSld>
+    <p:spTree>
+      <p:nvGrpSpPr>
+        <p:cNvPr id="1" name=""/>
+        <p:cNvGrpSpPr/>
+        <p:nvPr/>
+      </p:nvGrpSpPr>
+      <p:grpSpPr>
+        <a:xfrm>
+          <a:off x="0" y="0"/>
+          <a:ext cx="0" cy="0"/>
+          <a:chOff x="0" y="0"/>
+          <a:chExt cx="0" cy="0"/>
+        </a:xfrm>
+      </p:grpSpPr>
+      <p:sp>
+        <p:nvSpPr>
+          <p:cNvPr id="2" name="Slide Image Placeholder 1"/>
+          <p:cNvSpPr>
+            <a:spLocks noGrp="1" noRot="1" noChangeAspect="1"/>
+          </p:cNvSpPr>
+          <p:nvPr>
+            <p:ph type="sldImg"/>
+          </p:nvPr>
+        </p:nvSpPr>
+        <p:spPr/>
+      </p:sp>
+      <p:sp>
+        <p:nvSpPr>
+          <p:cNvPr id="3" name="Notes Placeholder 2"/>
+          <p:cNvSpPr>
+            <a:spLocks noGrp="1"/>
+          </p:cNvSpPr>
+          <p:nvPr>
+            <p:ph type="body" idx="1"/>
+          </p:nvPr>
+        </p:nvSpPr>
+        <p:spPr/>
+        <p:txBody>
+          <a:bodyPr/>
+          <a:lstStyle/>
+          <a:p>
+            <a:r>
+              <a:rPr lang="en-US" sz="1200" kern="1200" dirty="0" smtClean="0">
+                <a:solidFill>
+                  <a:schemeClr val="tx1"/>
+                </a:solidFill>
+                <a:effectLst/>
+                <a:latin typeface="+mn-lt"/>
+                <a:ea typeface="+mn-ea"/>
+                <a:cs typeface="+mn-cs"/>
+              </a:rPr>
+              <a:t>One deals with home inspections/smoke testing associated with county sewer (2 screenshots attached) and the other logs animal control incidents</a:t>
+            </a:r>
+            <a:r>
+              <a:rPr lang="en-US" sz="1200" kern="1200" dirty="0" smtClean="0">
+                <a:solidFill>
+                  <a:schemeClr val="tx1"/>
+                </a:solidFill>
+                <a:effectLst/>
+                <a:latin typeface="+mn-lt"/>
+                <a:ea typeface="+mn-ea"/>
+                <a:cs typeface="+mn-cs"/>
+              </a:rPr>
+              <a:t>.</a:t>
+            </a:r>
+          </a:p>
+          <a:p>
+            <a:r>
+              <a:rPr lang="en-US" sz="1200" kern="1200" dirty="0" smtClean="0">
+                <a:solidFill>
+                  <a:schemeClr val="tx1"/>
+                </a:solidFill>
+                <a:effectLst/>
+                <a:latin typeface="+mn-lt"/>
+                <a:ea typeface="+mn-ea"/>
+                <a:cs typeface="+mn-cs"/>
+              </a:rPr>
+              <a:t>They use a duplicate of their address layer that can be accessed</a:t>
+            </a:r>
+            <a:r>
+              <a:rPr lang="en-US" sz="1200" kern="1200" baseline="0" dirty="0" smtClean="0">
+                <a:solidFill>
+                  <a:schemeClr val="tx1"/>
+                </a:solidFill>
+                <a:effectLst/>
+                <a:latin typeface="+mn-lt"/>
+                <a:ea typeface="+mn-ea"/>
+                <a:cs typeface="+mn-cs"/>
+              </a:rPr>
+              <a:t> to provide relevant information for addresses they have checked this way.</a:t>
+            </a:r>
+            <a:endParaRPr lang="en-US" dirty="0"/>
+          </a:p>
+        </p:txBody>
+      </p:sp>
+      <p:sp>
+        <p:nvSpPr>
+          <p:cNvPr id="4" name="Slide Number Placeholder 3"/>
+          <p:cNvSpPr>
+            <a:spLocks noGrp="1"/>
+          </p:cNvSpPr>
+          <p:nvPr>
+            <p:ph type="sldNum" sz="quarter" idx="10"/>
+          </p:nvPr>
+        </p:nvSpPr>
+        <p:spPr/>
+        <p:txBody>
+          <a:bodyPr/>
+          <a:lstStyle/>
+          <a:p>
+            <a:fld id="{D143731E-6EDF-4D96-A7BF-7B3718149DDF}" type="slidenum">
+              <a:rPr lang="en-US" smtClean="0"/>
+              <a:t>6</a:t>
+            </a:fld>
+            <a:endParaRPr lang="en-US"/>
+          </a:p>
+        </p:txBody>
+      </p:sp>
+    </p:spTree>
+    <p:extLst>
+      <p:ext uri="{BB962C8B-B14F-4D97-AF65-F5344CB8AC3E}">
+        <p14:creationId xmlns:p14="http://schemas.microsoft.com/office/powerpoint/2010/main" val="1358648820"/>
+      </p:ext>
+    </p:extLst>
+  </p:cSld>
+  <p:clrMapOvr>
+    <a:masterClrMapping/>
+  </p:clrMapOvr>
+</p:notes>
+</file>
+
+<file path=ppt/notesSlides/notesSlide7.xml><?xml version="1.0" encoding="utf-8"?>
+<p:notes xmlns:a="http://schemas.openxmlformats.org/drawingml/2006/main" xmlns:r="http://schemas.openxmlformats.org/officeDocument/2006/relationships" xmlns:p="http://schemas.openxmlformats.org/presentationml/2006/main">
+  <p:cSld>
+    <p:spTree>
+      <p:nvGrpSpPr>
+        <p:cNvPr id="1" name=""/>
+        <p:cNvGrpSpPr/>
+        <p:nvPr/>
+      </p:nvGrpSpPr>
+      <p:grpSpPr>
+        <a:xfrm>
+          <a:off x="0" y="0"/>
+          <a:ext cx="0" cy="0"/>
+          <a:chOff x="0" y="0"/>
+          <a:chExt cx="0" cy="0"/>
+        </a:xfrm>
+      </p:grpSpPr>
+      <p:sp>
+        <p:nvSpPr>
+          <p:cNvPr id="2" name="Slide Image Placeholder 1"/>
+          <p:cNvSpPr>
+            <a:spLocks noGrp="1" noRot="1" noChangeAspect="1"/>
+          </p:cNvSpPr>
+          <p:nvPr>
+            <p:ph type="sldImg"/>
+          </p:nvPr>
+        </p:nvSpPr>
+        <p:spPr/>
+      </p:sp>
+      <p:sp>
+        <p:nvSpPr>
+          <p:cNvPr id="3" name="Notes Placeholder 2"/>
+          <p:cNvSpPr>
+            <a:spLocks noGrp="1"/>
+          </p:cNvSpPr>
+          <p:nvPr>
+            <p:ph type="body" idx="1"/>
+          </p:nvPr>
+        </p:nvSpPr>
+        <p:spPr/>
+        <p:txBody>
+          <a:bodyPr/>
+          <a:lstStyle/>
+          <a:p>
+            <a:r>
               <a:rPr lang="en-US" sz="1200" kern="1200" dirty="0" smtClean="0">
                 <a:solidFill>
                   <a:schemeClr val="tx1"/>
@@ -747,7 +1199,7 @@
           <a:p>
             <a:fld id="{D143731E-6EDF-4D96-A7BF-7B3718149DDF}" type="slidenum">
               <a:rPr lang="en-US" smtClean="0"/>
-              <a:t>6</a:t>
+              <a:t>7</a:t>
             </a:fld>
             <a:endParaRPr lang="en-US"/>
           </a:p>
@@ -757,6 +1209,104 @@
     <p:extLst>
       <p:ext uri="{BB962C8B-B14F-4D97-AF65-F5344CB8AC3E}">
         <p14:creationId xmlns:p14="http://schemas.microsoft.com/office/powerpoint/2010/main" val="1260465918"/>
+      </p:ext>
+    </p:extLst>
+  </p:cSld>
+  <p:clrMapOvr>
+    <a:masterClrMapping/>
+  </p:clrMapOvr>
+</p:notes>
+</file>
+
+<file path=ppt/notesSlides/notesSlide8.xml><?xml version="1.0" encoding="utf-8"?>
+<p:notes xmlns:a="http://schemas.openxmlformats.org/drawingml/2006/main" xmlns:r="http://schemas.openxmlformats.org/officeDocument/2006/relationships" xmlns:p="http://schemas.openxmlformats.org/presentationml/2006/main">
+  <p:cSld>
+    <p:spTree>
+      <p:nvGrpSpPr>
+        <p:cNvPr id="1" name=""/>
+        <p:cNvGrpSpPr/>
+        <p:nvPr/>
+      </p:nvGrpSpPr>
+      <p:grpSpPr>
+        <a:xfrm>
+          <a:off x="0" y="0"/>
+          <a:ext cx="0" cy="0"/>
+          <a:chOff x="0" y="0"/>
+          <a:chExt cx="0" cy="0"/>
+        </a:xfrm>
+      </p:grpSpPr>
+      <p:sp>
+        <p:nvSpPr>
+          <p:cNvPr id="2" name="Slide Image Placeholder 1"/>
+          <p:cNvSpPr>
+            <a:spLocks noGrp="1" noRot="1" noChangeAspect="1"/>
+          </p:cNvSpPr>
+          <p:nvPr>
+            <p:ph type="sldImg"/>
+          </p:nvPr>
+        </p:nvSpPr>
+        <p:spPr/>
+      </p:sp>
+      <p:sp>
+        <p:nvSpPr>
+          <p:cNvPr id="3" name="Notes Placeholder 2"/>
+          <p:cNvSpPr>
+            <a:spLocks noGrp="1"/>
+          </p:cNvSpPr>
+          <p:nvPr>
+            <p:ph type="body" idx="1"/>
+          </p:nvPr>
+        </p:nvSpPr>
+        <p:spPr/>
+        <p:txBody>
+          <a:bodyPr/>
+          <a:lstStyle/>
+          <a:p>
+            <a:r>
+              <a:rPr lang="en-US" dirty="0" smtClean="0"/>
+              <a:t>Theresa Miller and I</a:t>
+            </a:r>
+            <a:r>
+              <a:rPr lang="en-US" baseline="0" dirty="0" smtClean="0"/>
+              <a:t> use AGOL to put the Road Closure locations on the County Website.</a:t>
+            </a:r>
+          </a:p>
+          <a:p>
+            <a:r>
+              <a:rPr lang="en-US" baseline="0" dirty="0" smtClean="0"/>
+              <a:t>SHOW TILE GRID FROM COUNTY WEBSITE</a:t>
+            </a:r>
+            <a:endParaRPr lang="en-US" dirty="0"/>
+          </a:p>
+        </p:txBody>
+      </p:sp>
+      <p:sp>
+        <p:nvSpPr>
+          <p:cNvPr id="4" name="Slide Number Placeholder 3"/>
+          <p:cNvSpPr>
+            <a:spLocks noGrp="1"/>
+          </p:cNvSpPr>
+          <p:nvPr>
+            <p:ph type="sldNum" sz="quarter" idx="10"/>
+          </p:nvPr>
+        </p:nvSpPr>
+        <p:spPr/>
+        <p:txBody>
+          <a:bodyPr/>
+          <a:lstStyle/>
+          <a:p>
+            <a:fld id="{D143731E-6EDF-4D96-A7BF-7B3718149DDF}" type="slidenum">
+              <a:rPr lang="en-US" smtClean="0"/>
+              <a:t>8</a:t>
+            </a:fld>
+            <a:endParaRPr lang="en-US"/>
+          </a:p>
+        </p:txBody>
+      </p:sp>
+    </p:spTree>
+    <p:extLst>
+      <p:ext uri="{BB962C8B-B14F-4D97-AF65-F5344CB8AC3E}">
+        <p14:creationId xmlns:p14="http://schemas.microsoft.com/office/powerpoint/2010/main" val="3422928896"/>
       </p:ext>
     </p:extLst>
   </p:cSld>
@@ -996,7 +1546,7 @@
             <a:fld id="{B61BEF0D-F0BB-DE4B-95CE-6DB70DBA9567}" type="datetimeFigureOut">
               <a:rPr lang="en-US" dirty="0"/>
               <a:pPr/>
-              <a:t>11/22/2016</a:t>
+              <a:t>11/23/2016</a:t>
             </a:fld>
             <a:endParaRPr lang="en-US" dirty="0"/>
           </a:p>
@@ -1327,7 +1877,7 @@
             <a:fld id="{B61BEF0D-F0BB-DE4B-95CE-6DB70DBA9567}" type="datetimeFigureOut">
               <a:rPr lang="en-US" dirty="0"/>
               <a:pPr/>
-              <a:t>11/22/2016</a:t>
+              <a:t>11/23/2016</a:t>
             </a:fld>
             <a:endParaRPr lang="en-US" dirty="0"/>
           </a:p>
@@ -1602,7 +2152,7 @@
             <a:fld id="{B61BEF0D-F0BB-DE4B-95CE-6DB70DBA9567}" type="datetimeFigureOut">
               <a:rPr lang="en-US" dirty="0"/>
               <a:pPr/>
-              <a:t>11/22/2016</a:t>
+              <a:t>11/23/2016</a:t>
             </a:fld>
             <a:endParaRPr lang="en-US" dirty="0"/>
           </a:p>
@@ -2167,7 +2717,7 @@
             <a:fld id="{B61BEF0D-F0BB-DE4B-95CE-6DB70DBA9567}" type="datetimeFigureOut">
               <a:rPr lang="en-US" dirty="0"/>
               <a:pPr/>
-              <a:t>11/22/2016</a:t>
+              <a:t>11/23/2016</a:t>
             </a:fld>
             <a:endParaRPr lang="en-US" dirty="0"/>
           </a:p>
@@ -2442,7 +2992,7 @@
             <a:fld id="{B61BEF0D-F0BB-DE4B-95CE-6DB70DBA9567}" type="datetimeFigureOut">
               <a:rPr lang="en-US" dirty="0"/>
               <a:pPr/>
-              <a:t>11/22/2016</a:t>
+              <a:t>11/23/2016</a:t>
             </a:fld>
             <a:endParaRPr lang="en-US" dirty="0"/>
           </a:p>
@@ -3001,7 +3551,7 @@
             <a:fld id="{B61BEF0D-F0BB-DE4B-95CE-6DB70DBA9567}" type="datetimeFigureOut">
               <a:rPr lang="en-US" dirty="0"/>
               <a:pPr/>
-              <a:t>11/22/2016</a:t>
+              <a:t>11/23/2016</a:t>
             </a:fld>
             <a:endParaRPr lang="en-US" dirty="0"/>
           </a:p>
@@ -3325,7 +3875,7 @@
             <a:fld id="{B61BEF0D-F0BB-DE4B-95CE-6DB70DBA9567}" type="datetimeFigureOut">
               <a:rPr lang="en-US" dirty="0"/>
               <a:pPr/>
-              <a:t>11/22/2016</a:t>
+              <a:t>11/23/2016</a:t>
             </a:fld>
             <a:endParaRPr lang="en-US" dirty="0"/>
           </a:p>
@@ -3499,7 +4049,7 @@
             <a:fld id="{B61BEF0D-F0BB-DE4B-95CE-6DB70DBA9567}" type="datetimeFigureOut">
               <a:rPr lang="en-US" dirty="0"/>
               <a:pPr/>
-              <a:t>11/22/2016</a:t>
+              <a:t>11/23/2016</a:t>
             </a:fld>
             <a:endParaRPr lang="en-US" dirty="0"/>
           </a:p>
@@ -3734,7 +4284,7 @@
             <a:fld id="{B61BEF0D-F0BB-DE4B-95CE-6DB70DBA9567}" type="datetimeFigureOut">
               <a:rPr lang="en-US" dirty="0"/>
               <a:pPr/>
-              <a:t>11/22/2016</a:t>
+              <a:t>11/23/2016</a:t>
             </a:fld>
             <a:endParaRPr lang="en-US" dirty="0"/>
           </a:p>
@@ -3931,7 +4481,7 @@
             <a:fld id="{B61BEF0D-F0BB-DE4B-95CE-6DB70DBA9567}" type="datetimeFigureOut">
               <a:rPr lang="en-US" dirty="0"/>
               <a:pPr/>
-              <a:t>11/22/2016</a:t>
+              <a:t>11/23/2016</a:t>
             </a:fld>
             <a:endParaRPr lang="en-US" dirty="0"/>
           </a:p>
@@ -4204,7 +4754,7 @@
             <a:fld id="{B61BEF0D-F0BB-DE4B-95CE-6DB70DBA9567}" type="datetimeFigureOut">
               <a:rPr lang="en-US" dirty="0"/>
               <a:pPr/>
-              <a:t>11/22/2016</a:t>
+              <a:t>11/23/2016</a:t>
             </a:fld>
             <a:endParaRPr lang="en-US" dirty="0"/>
           </a:p>
@@ -4467,7 +5017,7 @@
             <a:fld id="{B61BEF0D-F0BB-DE4B-95CE-6DB70DBA9567}" type="datetimeFigureOut">
               <a:rPr lang="en-US" dirty="0"/>
               <a:pPr/>
-              <a:t>11/22/2016</a:t>
+              <a:t>11/23/2016</a:t>
             </a:fld>
             <a:endParaRPr lang="en-US" dirty="0"/>
           </a:p>
@@ -4838,7 +5388,7 @@
             <a:fld id="{B61BEF0D-F0BB-DE4B-95CE-6DB70DBA9567}" type="datetimeFigureOut">
               <a:rPr lang="en-US" dirty="0"/>
               <a:pPr/>
-              <a:t>11/22/2016</a:t>
+              <a:t>11/23/2016</a:t>
             </a:fld>
             <a:endParaRPr lang="en-US" dirty="0"/>
           </a:p>
@@ -4983,7 +5533,7 @@
             <a:fld id="{B61BEF0D-F0BB-DE4B-95CE-6DB70DBA9567}" type="datetimeFigureOut">
               <a:rPr lang="en-US" dirty="0"/>
               <a:pPr/>
-              <a:t>11/22/2016</a:t>
+              <a:t>11/23/2016</a:t>
             </a:fld>
             <a:endParaRPr lang="en-US" dirty="0"/>
           </a:p>
@@ -5105,7 +5655,7 @@
             <a:fld id="{B61BEF0D-F0BB-DE4B-95CE-6DB70DBA9567}" type="datetimeFigureOut">
               <a:rPr lang="en-US" dirty="0"/>
               <a:pPr/>
-              <a:t>11/22/2016</a:t>
+              <a:t>11/23/2016</a:t>
             </a:fld>
             <a:endParaRPr lang="en-US" dirty="0"/>
           </a:p>
@@ -5387,7 +5937,7 @@
             <a:fld id="{B61BEF0D-F0BB-DE4B-95CE-6DB70DBA9567}" type="datetimeFigureOut">
               <a:rPr lang="en-US" dirty="0"/>
               <a:pPr/>
-              <a:t>11/22/2016</a:t>
+              <a:t>11/23/2016</a:t>
             </a:fld>
             <a:endParaRPr lang="en-US" dirty="0"/>
           </a:p>
@@ -5708,7 +6258,7 @@
             <a:fld id="{B61BEF0D-F0BB-DE4B-95CE-6DB70DBA9567}" type="datetimeFigureOut">
               <a:rPr lang="en-US" dirty="0"/>
               <a:pPr/>
-              <a:t>11/22/2016</a:t>
+              <a:t>11/23/2016</a:t>
             </a:fld>
             <a:endParaRPr lang="en-US" dirty="0"/>
           </a:p>
@@ -5919,7 +6469,7 @@
             <a:fld id="{B61BEF0D-F0BB-DE4B-95CE-6DB70DBA9567}" type="datetimeFigureOut">
               <a:rPr lang="en-US" dirty="0"/>
               <a:pPr/>
-              <a:t>11/22/2016</a:t>
+              <a:t>11/23/2016</a:t>
             </a:fld>
             <a:endParaRPr lang="en-US" dirty="0"/>
           </a:p>
@@ -6546,12 +7096,26 @@
           <a:bodyPr/>
           <a:lstStyle/>
           <a:p>
+            <a:pPr>
+              <a:buClr>
+                <a:schemeClr val="accent4">
+                  <a:lumMod val="75000"/>
+                </a:schemeClr>
+              </a:buClr>
+            </a:pPr>
             <a:r>
               <a:rPr lang="en-US" dirty="0" smtClean="0"/>
               <a:t>Easy to use</a:t>
             </a:r>
           </a:p>
           <a:p>
+            <a:pPr>
+              <a:buClr>
+                <a:schemeClr val="accent4">
+                  <a:lumMod val="75000"/>
+                </a:schemeClr>
+              </a:buClr>
+            </a:pPr>
             <a:r>
               <a:rPr lang="en-US" dirty="0" smtClean="0"/>
               <a:t>Data can be accessed &amp; edited from Apps (Collector, Survey 123, and other </a:t>
@@ -6566,12 +7130,36 @@
             </a:r>
           </a:p>
           <a:p>
+            <a:pPr>
+              <a:buClr>
+                <a:schemeClr val="accent4">
+                  <a:lumMod val="75000"/>
+                </a:schemeClr>
+              </a:buClr>
+            </a:pPr>
+            <a:r>
+              <a:rPr lang="en-US" dirty="0" smtClean="0"/>
+              <a:t>Potentially eliminates paperwork by entering data directly into the enterprise database</a:t>
+            </a:r>
+            <a:endParaRPr lang="en-US" dirty="0" smtClean="0"/>
+          </a:p>
+          <a:p>
+            <a:pPr>
+              <a:buClr>
+                <a:srgbClr val="FF0000"/>
+              </a:buClr>
+            </a:pPr>
             <a:r>
               <a:rPr lang="en-US" dirty="0" smtClean="0"/>
               <a:t>Some restrictions apply to editing of private layers</a:t>
             </a:r>
           </a:p>
           <a:p>
+            <a:pPr>
+              <a:buClr>
+                <a:srgbClr val="FF0000"/>
+              </a:buClr>
+            </a:pPr>
             <a:r>
               <a:rPr lang="en-US" dirty="0" smtClean="0"/>
               <a:t>1 user per ArcGIS Desktop License (we have 5 total; DPU, Eng., Planning, Econ Dev. </a:t>
@@ -6634,66 +7222,47 @@
           <a:lstStyle/>
           <a:p>
             <a:r>
+              <a:rPr lang="en-US" dirty="0" err="1" smtClean="0"/>
+              <a:t>Arcgis</a:t>
+            </a:r>
+            <a:r>
               <a:rPr lang="en-US" dirty="0" smtClean="0"/>
-              <a:t>ArcGIS Online (AGOL) Demo</a:t>
-            </a:r>
-            <a:endParaRPr lang="en-US" dirty="0"/>
-          </a:p>
-        </p:txBody>
-      </p:sp>
-      <p:sp>
-        <p:nvSpPr>
-          <p:cNvPr id="3" name="Content Placeholder 2"/>
-          <p:cNvSpPr>
-            <a:spLocks noGrp="1"/>
-          </p:cNvSpPr>
+              <a:t> online plans</a:t>
+            </a:r>
+            <a:endParaRPr lang="en-US" dirty="0"/>
+          </a:p>
+        </p:txBody>
+      </p:sp>
+      <p:pic>
+        <p:nvPicPr>
+          <p:cNvPr id="4" name="Content Placeholder 3"/>
+          <p:cNvPicPr>
+            <a:picLocks noGrp="1" noChangeAspect="1"/>
+          </p:cNvPicPr>
           <p:nvPr>
             <p:ph idx="1"/>
           </p:nvPr>
-        </p:nvSpPr>
-        <p:spPr/>
-        <p:txBody>
-          <a:bodyPr/>
-          <a:lstStyle/>
-          <a:p>
-            <a:r>
-              <a:rPr lang="en-US" dirty="0" smtClean="0"/>
-              <a:t>Road Closure Maps (example currently being used)</a:t>
-            </a:r>
-          </a:p>
-          <a:p>
-            <a:r>
-              <a:rPr lang="en-US" dirty="0" smtClean="0"/>
-              <a:t>Tile Grid Map </a:t>
-            </a:r>
-            <a:r>
-              <a:rPr lang="en-US" dirty="0"/>
-              <a:t>(example currently being used</a:t>
-            </a:r>
-            <a:r>
-              <a:rPr lang="en-US" dirty="0" smtClean="0"/>
-              <a:t>)</a:t>
-            </a:r>
-          </a:p>
-          <a:p>
-            <a:r>
-              <a:rPr lang="en-US" dirty="0" smtClean="0"/>
-              <a:t>Asset Mapping (not sure yet if this will be a demo or a discussion).</a:t>
-            </a:r>
-          </a:p>
-          <a:p>
-            <a:r>
-              <a:rPr lang="en-US" dirty="0" smtClean="0"/>
-              <a:t>COLLECTOR DEMO (HERE OR LATER???)</a:t>
-            </a:r>
-            <a:endParaRPr lang="en-US" dirty="0"/>
-          </a:p>
-        </p:txBody>
-      </p:sp>
+        </p:nvPicPr>
+        <p:blipFill>
+          <a:blip r:embed="rId3"/>
+          <a:stretch>
+            <a:fillRect/>
+          </a:stretch>
+        </p:blipFill>
+        <p:spPr>
+          <a:xfrm>
+            <a:off x="2762213" y="1812175"/>
+            <a:ext cx="6425150" cy="4630189"/>
+          </a:xfrm>
+          <a:prstGeom prst="rect">
+            <a:avLst/>
+          </a:prstGeom>
+        </p:spPr>
+      </p:pic>
     </p:spTree>
     <p:extLst>
       <p:ext uri="{BB962C8B-B14F-4D97-AF65-F5344CB8AC3E}">
-        <p14:creationId xmlns:p14="http://schemas.microsoft.com/office/powerpoint/2010/main" val="2767954815"/>
+        <p14:creationId xmlns:p14="http://schemas.microsoft.com/office/powerpoint/2010/main" val="4244901593"/>
       </p:ext>
     </p:extLst>
   </p:cSld>
@@ -6737,7 +7306,7 @@
           <a:p>
             <a:r>
               <a:rPr lang="en-US" dirty="0" smtClean="0"/>
-              <a:t>SLIDE showing benefits of this and how it does the job of a failsafe (backups?)</a:t>
+              <a:t>App Flavors</a:t>
             </a:r>
             <a:endParaRPr lang="en-US" dirty="0"/>
           </a:p>
@@ -6758,14 +7327,71 @@
           <a:bodyPr/>
           <a:lstStyle/>
           <a:p>
-            <a:endParaRPr lang="en-US"/>
-          </a:p>
-        </p:txBody>
-      </p:sp>
+            <a:r>
+              <a:rPr lang="en-US" dirty="0" smtClean="0"/>
+              <a:t>Collector</a:t>
+            </a:r>
+          </a:p>
+          <a:p>
+            <a:r>
+              <a:rPr lang="en-US" dirty="0" smtClean="0"/>
+              <a:t>Workforce</a:t>
+            </a:r>
+          </a:p>
+          <a:p>
+            <a:r>
+              <a:rPr lang="en-US" dirty="0" smtClean="0"/>
+              <a:t>Survey 1, 2, 3</a:t>
+            </a:r>
+          </a:p>
+          <a:p>
+            <a:r>
+              <a:rPr lang="en-US" dirty="0" smtClean="0"/>
+              <a:t>App Studio (Custom Applications)</a:t>
+            </a:r>
+            <a:endParaRPr lang="en-US" dirty="0"/>
+          </a:p>
+        </p:txBody>
+      </p:sp>
+      <p:pic>
+        <p:nvPicPr>
+          <p:cNvPr id="4" name="Picture 3"/>
+          <p:cNvPicPr>
+            <a:picLocks noChangeAspect="1"/>
+          </p:cNvPicPr>
+          <p:nvPr/>
+        </p:nvPicPr>
+        <p:blipFill>
+          <a:blip r:embed="rId3">
+            <a:extLst>
+              <a:ext uri="{28A0092B-C50C-407E-A947-70E740481C1C}">
+                <a14:useLocalDpi xmlns:a14="http://schemas.microsoft.com/office/drawing/2010/main" val="0"/>
+              </a:ext>
+            </a:extLst>
+          </a:blip>
+          <a:stretch>
+            <a:fillRect/>
+          </a:stretch>
+        </p:blipFill>
+        <p:spPr>
+          <a:xfrm>
+            <a:off x="5411744" y="752088"/>
+            <a:ext cx="4762500" cy="2981325"/>
+          </a:xfrm>
+          <a:prstGeom prst="rect">
+            <a:avLst/>
+          </a:prstGeom>
+          <a:ln w="25400">
+            <a:solidFill>
+              <a:schemeClr val="accent1"/>
+            </a:solidFill>
+          </a:ln>
+        </p:spPr>
+      </p:pic>
     </p:spTree>
     <p:extLst>
       <p:ext uri="{BB962C8B-B14F-4D97-AF65-F5344CB8AC3E}">
-        <p14:creationId xmlns:p14="http://schemas.microsoft.com/office/powerpoint/2010/main" val="3536336371"/>
+        <p14:creationId xmlns:p14="http://schemas.microsoft.com/office/powerpoint/2010/main" val="3646532932"/>
       </p:ext>
     </p:extLst>
   </p:cSld>
@@ -6809,45 +7435,53 @@
           <a:p>
             <a:r>
               <a:rPr lang="en-US" dirty="0" smtClean="0"/>
-              <a:t>Allegany County – Home Inspections</a:t>
-            </a:r>
-            <a:endParaRPr lang="en-US" dirty="0"/>
-          </a:p>
-        </p:txBody>
-      </p:sp>
-      <p:pic>
-        <p:nvPicPr>
-          <p:cNvPr id="4" name="Content Placeholder 3"/>
-          <p:cNvPicPr>
-            <a:picLocks noGrp="1" noChangeAspect="1"/>
-          </p:cNvPicPr>
+              <a:t>Success Stories</a:t>
+            </a:r>
+            <a:endParaRPr lang="en-US" dirty="0"/>
+          </a:p>
+        </p:txBody>
+      </p:sp>
+      <p:sp>
+        <p:nvSpPr>
+          <p:cNvPr id="3" name="Content Placeholder 2"/>
+          <p:cNvSpPr>
+            <a:spLocks noGrp="1"/>
+          </p:cNvSpPr>
           <p:nvPr>
             <p:ph idx="1"/>
           </p:nvPr>
-        </p:nvPicPr>
-        <p:blipFill>
-          <a:blip r:embed="rId3">
-            <a:extLst>
-              <a:ext uri="{28A0092B-C50C-407E-A947-70E740481C1C}">
-                <a14:useLocalDpi xmlns:a14="http://schemas.microsoft.com/office/drawing/2010/main" val="0"/>
-              </a:ext>
-            </a:extLst>
-          </a:blip>
-          <a:stretch>
-            <a:fillRect/>
-          </a:stretch>
-        </p:blipFill>
-        <p:spPr>
-          <a:xfrm>
-            <a:off x="2767364" y="1794630"/>
-            <a:ext cx="6324359" cy="4743269"/>
-          </a:xfrm>
-        </p:spPr>
-      </p:pic>
+        </p:nvSpPr>
+        <p:spPr/>
+        <p:txBody>
+          <a:bodyPr/>
+          <a:lstStyle/>
+          <a:p>
+            <a:r>
+              <a:rPr lang="en-US" dirty="0" smtClean="0"/>
+              <a:t>Prince George’s County Snow Removal Application with Collector</a:t>
+            </a:r>
+          </a:p>
+          <a:p>
+            <a:r>
+              <a:rPr lang="en-US" dirty="0" smtClean="0"/>
+              <a:t>Prince George’s County Liquor Control Board Inspections</a:t>
+            </a:r>
+          </a:p>
+          <a:p>
+            <a:r>
+              <a:rPr lang="en-US" dirty="0" smtClean="0"/>
+              <a:t>Allegany County Home Inspections (Smoke Testing), and Animal Control (Others too)</a:t>
+            </a:r>
+          </a:p>
+          <a:p>
+            <a:endParaRPr lang="en-US" dirty="0"/>
+          </a:p>
+        </p:txBody>
+      </p:sp>
     </p:spTree>
     <p:extLst>
       <p:ext uri="{BB962C8B-B14F-4D97-AF65-F5344CB8AC3E}">
-        <p14:creationId xmlns:p14="http://schemas.microsoft.com/office/powerpoint/2010/main" val="2994802026"/>
+        <p14:creationId xmlns:p14="http://schemas.microsoft.com/office/powerpoint/2010/main" val="1635831896"/>
       </p:ext>
     </p:extLst>
   </p:cSld>
@@ -6922,14 +7556,208 @@
         <p:spPr>
           <a:xfrm>
             <a:off x="2767364" y="1794630"/>
+            <a:ext cx="6324359" cy="4743269"/>
+          </a:xfrm>
+          <a:ln w="25400">
+            <a:solidFill>
+              <a:schemeClr val="accent1"/>
+            </a:solidFill>
+          </a:ln>
+        </p:spPr>
+      </p:pic>
+    </p:spTree>
+    <p:extLst>
+      <p:ext uri="{BB962C8B-B14F-4D97-AF65-F5344CB8AC3E}">
+        <p14:creationId xmlns:p14="http://schemas.microsoft.com/office/powerpoint/2010/main" val="2994802026"/>
+      </p:ext>
+    </p:extLst>
+  </p:cSld>
+  <p:clrMapOvr>
+    <a:masterClrMapping/>
+  </p:clrMapOvr>
+</p:sld>
+</file>
+
+<file path=ppt/slides/slide7.xml><?xml version="1.0" encoding="utf-8"?>
+<p:sld xmlns:a="http://schemas.openxmlformats.org/drawingml/2006/main" xmlns:r="http://schemas.openxmlformats.org/officeDocument/2006/relationships" xmlns:p="http://schemas.openxmlformats.org/presentationml/2006/main">
+  <p:cSld>
+    <p:spTree>
+      <p:nvGrpSpPr>
+        <p:cNvPr id="1" name=""/>
+        <p:cNvGrpSpPr/>
+        <p:nvPr/>
+      </p:nvGrpSpPr>
+      <p:grpSpPr>
+        <a:xfrm>
+          <a:off x="0" y="0"/>
+          <a:ext cx="0" cy="0"/>
+          <a:chOff x="0" y="0"/>
+          <a:chExt cx="0" cy="0"/>
+        </a:xfrm>
+      </p:grpSpPr>
+      <p:sp>
+        <p:nvSpPr>
+          <p:cNvPr id="2" name="Title 1"/>
+          <p:cNvSpPr>
+            <a:spLocks noGrp="1"/>
+          </p:cNvSpPr>
+          <p:nvPr>
+            <p:ph type="title"/>
+          </p:nvPr>
+        </p:nvSpPr>
+        <p:spPr/>
+        <p:txBody>
+          <a:bodyPr/>
+          <a:lstStyle/>
+          <a:p>
+            <a:r>
+              <a:rPr lang="en-US" dirty="0" smtClean="0"/>
+              <a:t>Allegany County – Home Inspections</a:t>
+            </a:r>
+            <a:endParaRPr lang="en-US" dirty="0"/>
+          </a:p>
+        </p:txBody>
+      </p:sp>
+      <p:pic>
+        <p:nvPicPr>
+          <p:cNvPr id="4" name="Content Placeholder 3"/>
+          <p:cNvPicPr>
+            <a:picLocks noGrp="1" noChangeAspect="1"/>
+          </p:cNvPicPr>
+          <p:nvPr>
+            <p:ph idx="1"/>
+          </p:nvPr>
+        </p:nvPicPr>
+        <p:blipFill>
+          <a:blip r:embed="rId3">
+            <a:extLst>
+              <a:ext uri="{28A0092B-C50C-407E-A947-70E740481C1C}">
+                <a14:useLocalDpi xmlns:a14="http://schemas.microsoft.com/office/drawing/2010/main" val="0"/>
+              </a:ext>
+            </a:extLst>
+          </a:blip>
+          <a:stretch>
+            <a:fillRect/>
+          </a:stretch>
+        </p:blipFill>
+        <p:spPr>
+          <a:xfrm>
+            <a:off x="2767364" y="1794630"/>
             <a:ext cx="6324358" cy="4743269"/>
           </a:xfrm>
+          <a:ln w="25400">
+            <a:solidFill>
+              <a:schemeClr val="accent1"/>
+            </a:solidFill>
+          </a:ln>
         </p:spPr>
       </p:pic>
     </p:spTree>
     <p:extLst>
       <p:ext uri="{BB962C8B-B14F-4D97-AF65-F5344CB8AC3E}">
         <p14:creationId xmlns:p14="http://schemas.microsoft.com/office/powerpoint/2010/main" val="1055084255"/>
+      </p:ext>
+    </p:extLst>
+  </p:cSld>
+  <p:clrMapOvr>
+    <a:masterClrMapping/>
+  </p:clrMapOvr>
+</p:sld>
+</file>
+
+<file path=ppt/slides/slide8.xml><?xml version="1.0" encoding="utf-8"?>
+<p:sld xmlns:a="http://schemas.openxmlformats.org/drawingml/2006/main" xmlns:r="http://schemas.openxmlformats.org/officeDocument/2006/relationships" xmlns:p="http://schemas.openxmlformats.org/presentationml/2006/main">
+  <p:cSld>
+    <p:spTree>
+      <p:nvGrpSpPr>
+        <p:cNvPr id="1" name=""/>
+        <p:cNvGrpSpPr/>
+        <p:nvPr/>
+      </p:nvGrpSpPr>
+      <p:grpSpPr>
+        <a:xfrm>
+          <a:off x="0" y="0"/>
+          <a:ext cx="0" cy="0"/>
+          <a:chOff x="0" y="0"/>
+          <a:chExt cx="0" cy="0"/>
+        </a:xfrm>
+      </p:grpSpPr>
+      <p:sp>
+        <p:nvSpPr>
+          <p:cNvPr id="2" name="Title 1"/>
+          <p:cNvSpPr>
+            <a:spLocks noGrp="1"/>
+          </p:cNvSpPr>
+          <p:nvPr>
+            <p:ph type="title"/>
+          </p:nvPr>
+        </p:nvSpPr>
+        <p:spPr/>
+        <p:txBody>
+          <a:bodyPr/>
+          <a:lstStyle/>
+          <a:p>
+            <a:r>
+              <a:rPr lang="en-US" dirty="0" smtClean="0"/>
+              <a:t>ArcGIS Online (AGOL) Demo</a:t>
+            </a:r>
+            <a:endParaRPr lang="en-US" dirty="0"/>
+          </a:p>
+        </p:txBody>
+      </p:sp>
+      <p:sp>
+        <p:nvSpPr>
+          <p:cNvPr id="3" name="Content Placeholder 2"/>
+          <p:cNvSpPr>
+            <a:spLocks noGrp="1"/>
+          </p:cNvSpPr>
+          <p:nvPr>
+            <p:ph idx="1"/>
+          </p:nvPr>
+        </p:nvSpPr>
+        <p:spPr/>
+        <p:txBody>
+          <a:bodyPr/>
+          <a:lstStyle/>
+          <a:p>
+            <a:r>
+              <a:rPr lang="en-US" dirty="0" smtClean="0"/>
+              <a:t>Road Closure Maps (example currently being used)</a:t>
+            </a:r>
+          </a:p>
+          <a:p>
+            <a:r>
+              <a:rPr lang="en-US" dirty="0" smtClean="0"/>
+              <a:t>Tile Grid Map </a:t>
+            </a:r>
+            <a:r>
+              <a:rPr lang="en-US" dirty="0"/>
+              <a:t>(example currently being used</a:t>
+            </a:r>
+            <a:r>
+              <a:rPr lang="en-US" dirty="0" smtClean="0"/>
+              <a:t>)</a:t>
+            </a:r>
+          </a:p>
+          <a:p>
+            <a:r>
+              <a:rPr lang="en-US" dirty="0" smtClean="0"/>
+              <a:t>Asset Mapping (not sure yet if this will be a demo or a discussion).</a:t>
+            </a:r>
+          </a:p>
+          <a:p>
+            <a:r>
+              <a:rPr lang="en-US" dirty="0" smtClean="0"/>
+              <a:t>COLLECTOR DEMO (HERE OR LATER???)</a:t>
+            </a:r>
+            <a:endParaRPr lang="en-US" dirty="0"/>
+          </a:p>
+        </p:txBody>
+      </p:sp>
+    </p:spTree>
+    <p:extLst>
+      <p:ext uri="{BB962C8B-B14F-4D97-AF65-F5344CB8AC3E}">
+        <p14:creationId xmlns:p14="http://schemas.microsoft.com/office/powerpoint/2010/main" val="2767954815"/>
       </p:ext>
     </p:extLst>
   </p:cSld>

</xml_diff>

<commit_message>
minor update to pptx "FieldDataCollection.pptx".
</commit_message>
<xml_diff>
--- a/FieldDataCollection.pptx
+++ b/FieldDataCollection.pptx
@@ -204,7 +204,7 @@
           <a:p>
             <a:fld id="{99A8F4B2-2777-4C7D-9190-24BE9C783CF1}" type="datetimeFigureOut">
               <a:rPr lang="en-US" smtClean="0"/>
-              <a:t>11/23/2016</a:t>
+              <a:t>12/12/2016</a:t>
             </a:fld>
             <a:endParaRPr lang="en-US"/>
           </a:p>
@@ -1030,10 +1030,10 @@
                 <a:ea typeface="+mn-ea"/>
                 <a:cs typeface="+mn-cs"/>
               </a:rPr>
-              <a:t>One deals with home inspections/smoke testing associated with county sewer (2 screenshots attached) and the other logs animal control incidents</a:t>
-            </a:r>
-            <a:r>
-              <a:rPr lang="en-US" sz="1200" kern="1200" dirty="0" smtClean="0">
+              <a:t>One application that</a:t>
+            </a:r>
+            <a:r>
+              <a:rPr lang="en-US" sz="1200" kern="1200" baseline="0" dirty="0" smtClean="0">
                 <a:solidFill>
                   <a:schemeClr val="tx1"/>
                 </a:solidFill>
@@ -1042,7 +1042,31 @@
                 <a:ea typeface="+mn-ea"/>
                 <a:cs typeface="+mn-cs"/>
               </a:rPr>
-              <a:t>.</a:t>
+              <a:t> Allegany County uses,</a:t>
+            </a:r>
+            <a:r>
+              <a:rPr lang="en-US" sz="1200" kern="1200" dirty="0" smtClean="0">
+                <a:solidFill>
+                  <a:schemeClr val="tx1"/>
+                </a:solidFill>
+                <a:effectLst/>
+                <a:latin typeface="+mn-lt"/>
+                <a:ea typeface="+mn-ea"/>
+                <a:cs typeface="+mn-cs"/>
+              </a:rPr>
+              <a:t> </a:t>
+            </a:r>
+            <a:r>
+              <a:rPr lang="en-US" sz="1200" kern="1200" dirty="0" smtClean="0">
+                <a:solidFill>
+                  <a:schemeClr val="tx1"/>
+                </a:solidFill>
+                <a:effectLst/>
+                <a:latin typeface="+mn-lt"/>
+                <a:ea typeface="+mn-ea"/>
+                <a:cs typeface="+mn-cs"/>
+              </a:rPr>
+              <a:t>deals with home inspections/smoke testing associated with county sewer (2 screenshots attached) and the other logs animal control incidents.</a:t>
             </a:r>
           </a:p>
           <a:p>
@@ -1164,7 +1188,45 @@
                 <a:ea typeface="+mn-ea"/>
                 <a:cs typeface="+mn-cs"/>
               </a:rPr>
-              <a:t>They are also working on a Workforce</a:t>
+              <a:t>The data keeps</a:t>
+            </a:r>
+            <a:r>
+              <a:rPr lang="en-US" sz="1200" kern="1200" baseline="0" dirty="0" smtClean="0">
+                <a:solidFill>
+                  <a:schemeClr val="tx1"/>
+                </a:solidFill>
+                <a:effectLst/>
+                <a:latin typeface="+mn-lt"/>
+                <a:ea typeface="+mn-ea"/>
+                <a:cs typeface="+mn-cs"/>
+              </a:rPr>
+              <a:t> things up to date so they don’t repeat testing where it has already been done.</a:t>
+            </a:r>
+          </a:p>
+          <a:p>
+            <a:r>
+              <a:rPr lang="en-US" sz="1200" kern="1200" dirty="0" smtClean="0">
+                <a:solidFill>
+                  <a:schemeClr val="tx1"/>
+                </a:solidFill>
+                <a:effectLst/>
+                <a:latin typeface="+mn-lt"/>
+                <a:ea typeface="+mn-ea"/>
+                <a:cs typeface="+mn-cs"/>
+              </a:rPr>
+              <a:t>They </a:t>
+            </a:r>
+            <a:r>
+              <a:rPr lang="en-US" sz="1200" kern="1200" dirty="0" smtClean="0">
+                <a:solidFill>
+                  <a:schemeClr val="tx1"/>
+                </a:solidFill>
+                <a:effectLst/>
+                <a:latin typeface="+mn-lt"/>
+                <a:ea typeface="+mn-ea"/>
+                <a:cs typeface="+mn-cs"/>
+              </a:rPr>
+              <a:t>are also working on a Workforce</a:t>
             </a:r>
             <a:r>
               <a:rPr lang="en-US" sz="1200" kern="1200" baseline="0" dirty="0" smtClean="0">
@@ -1546,7 +1608,7 @@
             <a:fld id="{B61BEF0D-F0BB-DE4B-95CE-6DB70DBA9567}" type="datetimeFigureOut">
               <a:rPr lang="en-US" dirty="0"/>
               <a:pPr/>
-              <a:t>11/23/2016</a:t>
+              <a:t>12/12/2016</a:t>
             </a:fld>
             <a:endParaRPr lang="en-US" dirty="0"/>
           </a:p>
@@ -1877,7 +1939,7 @@
             <a:fld id="{B61BEF0D-F0BB-DE4B-95CE-6DB70DBA9567}" type="datetimeFigureOut">
               <a:rPr lang="en-US" dirty="0"/>
               <a:pPr/>
-              <a:t>11/23/2016</a:t>
+              <a:t>12/12/2016</a:t>
             </a:fld>
             <a:endParaRPr lang="en-US" dirty="0"/>
           </a:p>
@@ -2152,7 +2214,7 @@
             <a:fld id="{B61BEF0D-F0BB-DE4B-95CE-6DB70DBA9567}" type="datetimeFigureOut">
               <a:rPr lang="en-US" dirty="0"/>
               <a:pPr/>
-              <a:t>11/23/2016</a:t>
+              <a:t>12/12/2016</a:t>
             </a:fld>
             <a:endParaRPr lang="en-US" dirty="0"/>
           </a:p>
@@ -2717,7 +2779,7 @@
             <a:fld id="{B61BEF0D-F0BB-DE4B-95CE-6DB70DBA9567}" type="datetimeFigureOut">
               <a:rPr lang="en-US" dirty="0"/>
               <a:pPr/>
-              <a:t>11/23/2016</a:t>
+              <a:t>12/12/2016</a:t>
             </a:fld>
             <a:endParaRPr lang="en-US" dirty="0"/>
           </a:p>
@@ -2992,7 +3054,7 @@
             <a:fld id="{B61BEF0D-F0BB-DE4B-95CE-6DB70DBA9567}" type="datetimeFigureOut">
               <a:rPr lang="en-US" dirty="0"/>
               <a:pPr/>
-              <a:t>11/23/2016</a:t>
+              <a:t>12/12/2016</a:t>
             </a:fld>
             <a:endParaRPr lang="en-US" dirty="0"/>
           </a:p>
@@ -3551,7 +3613,7 @@
             <a:fld id="{B61BEF0D-F0BB-DE4B-95CE-6DB70DBA9567}" type="datetimeFigureOut">
               <a:rPr lang="en-US" dirty="0"/>
               <a:pPr/>
-              <a:t>11/23/2016</a:t>
+              <a:t>12/12/2016</a:t>
             </a:fld>
             <a:endParaRPr lang="en-US" dirty="0"/>
           </a:p>
@@ -3875,7 +3937,7 @@
             <a:fld id="{B61BEF0D-F0BB-DE4B-95CE-6DB70DBA9567}" type="datetimeFigureOut">
               <a:rPr lang="en-US" dirty="0"/>
               <a:pPr/>
-              <a:t>11/23/2016</a:t>
+              <a:t>12/12/2016</a:t>
             </a:fld>
             <a:endParaRPr lang="en-US" dirty="0"/>
           </a:p>
@@ -4049,7 +4111,7 @@
             <a:fld id="{B61BEF0D-F0BB-DE4B-95CE-6DB70DBA9567}" type="datetimeFigureOut">
               <a:rPr lang="en-US" dirty="0"/>
               <a:pPr/>
-              <a:t>11/23/2016</a:t>
+              <a:t>12/12/2016</a:t>
             </a:fld>
             <a:endParaRPr lang="en-US" dirty="0"/>
           </a:p>
@@ -4284,7 +4346,7 @@
             <a:fld id="{B61BEF0D-F0BB-DE4B-95CE-6DB70DBA9567}" type="datetimeFigureOut">
               <a:rPr lang="en-US" dirty="0"/>
               <a:pPr/>
-              <a:t>11/23/2016</a:t>
+              <a:t>12/12/2016</a:t>
             </a:fld>
             <a:endParaRPr lang="en-US" dirty="0"/>
           </a:p>
@@ -4481,7 +4543,7 @@
             <a:fld id="{B61BEF0D-F0BB-DE4B-95CE-6DB70DBA9567}" type="datetimeFigureOut">
               <a:rPr lang="en-US" dirty="0"/>
               <a:pPr/>
-              <a:t>11/23/2016</a:t>
+              <a:t>12/12/2016</a:t>
             </a:fld>
             <a:endParaRPr lang="en-US" dirty="0"/>
           </a:p>
@@ -4754,7 +4816,7 @@
             <a:fld id="{B61BEF0D-F0BB-DE4B-95CE-6DB70DBA9567}" type="datetimeFigureOut">
               <a:rPr lang="en-US" dirty="0"/>
               <a:pPr/>
-              <a:t>11/23/2016</a:t>
+              <a:t>12/12/2016</a:t>
             </a:fld>
             <a:endParaRPr lang="en-US" dirty="0"/>
           </a:p>
@@ -5017,7 +5079,7 @@
             <a:fld id="{B61BEF0D-F0BB-DE4B-95CE-6DB70DBA9567}" type="datetimeFigureOut">
               <a:rPr lang="en-US" dirty="0"/>
               <a:pPr/>
-              <a:t>11/23/2016</a:t>
+              <a:t>12/12/2016</a:t>
             </a:fld>
             <a:endParaRPr lang="en-US" dirty="0"/>
           </a:p>
@@ -5388,7 +5450,7 @@
             <a:fld id="{B61BEF0D-F0BB-DE4B-95CE-6DB70DBA9567}" type="datetimeFigureOut">
               <a:rPr lang="en-US" dirty="0"/>
               <a:pPr/>
-              <a:t>11/23/2016</a:t>
+              <a:t>12/12/2016</a:t>
             </a:fld>
             <a:endParaRPr lang="en-US" dirty="0"/>
           </a:p>
@@ -5533,7 +5595,7 @@
             <a:fld id="{B61BEF0D-F0BB-DE4B-95CE-6DB70DBA9567}" type="datetimeFigureOut">
               <a:rPr lang="en-US" dirty="0"/>
               <a:pPr/>
-              <a:t>11/23/2016</a:t>
+              <a:t>12/12/2016</a:t>
             </a:fld>
             <a:endParaRPr lang="en-US" dirty="0"/>
           </a:p>
@@ -5655,7 +5717,7 @@
             <a:fld id="{B61BEF0D-F0BB-DE4B-95CE-6DB70DBA9567}" type="datetimeFigureOut">
               <a:rPr lang="en-US" dirty="0"/>
               <a:pPr/>
-              <a:t>11/23/2016</a:t>
+              <a:t>12/12/2016</a:t>
             </a:fld>
             <a:endParaRPr lang="en-US" dirty="0"/>
           </a:p>
@@ -5937,7 +5999,7 @@
             <a:fld id="{B61BEF0D-F0BB-DE4B-95CE-6DB70DBA9567}" type="datetimeFigureOut">
               <a:rPr lang="en-US" dirty="0"/>
               <a:pPr/>
-              <a:t>11/23/2016</a:t>
+              <a:t>12/12/2016</a:t>
             </a:fld>
             <a:endParaRPr lang="en-US" dirty="0"/>
           </a:p>
@@ -6258,7 +6320,7 @@
             <a:fld id="{B61BEF0D-F0BB-DE4B-95CE-6DB70DBA9567}" type="datetimeFigureOut">
               <a:rPr lang="en-US" dirty="0"/>
               <a:pPr/>
-              <a:t>11/23/2016</a:t>
+              <a:t>12/12/2016</a:t>
             </a:fld>
             <a:endParaRPr lang="en-US" dirty="0"/>
           </a:p>
@@ -6469,7 +6531,7 @@
             <a:fld id="{B61BEF0D-F0BB-DE4B-95CE-6DB70DBA9567}" type="datetimeFigureOut">
               <a:rPr lang="en-US" dirty="0"/>
               <a:pPr/>
-              <a:t>11/23/2016</a:t>
+              <a:t>12/12/2016</a:t>
             </a:fld>
             <a:endParaRPr lang="en-US" dirty="0"/>
           </a:p>
@@ -7038,6 +7100,13 @@
   <p:clrMapOvr>
     <a:masterClrMapping/>
   </p:clrMapOvr>
+  <p:timing>
+    <p:tnLst>
+      <p:par>
+        <p:cTn id="1" dur="indefinite" restart="never" nodeType="tmRoot"/>
+      </p:par>
+    </p:tnLst>
+  </p:timing>
 </p:sld>
 </file>
 
@@ -7141,7 +7210,6 @@
               <a:rPr lang="en-US" dirty="0" smtClean="0"/>
               <a:t>Potentially eliminates paperwork by entering data directly into the enterprise database</a:t>
             </a:r>
-            <a:endParaRPr lang="en-US" dirty="0" smtClean="0"/>
           </a:p>
           <a:p>
             <a:pPr>
@@ -7186,6 +7254,13 @@
   <p:clrMapOvr>
     <a:masterClrMapping/>
   </p:clrMapOvr>
+  <p:timing>
+    <p:tnLst>
+      <p:par>
+        <p:cTn id="1" dur="indefinite" restart="never" nodeType="tmRoot"/>
+      </p:par>
+    </p:tnLst>
+  </p:timing>
 </p:sld>
 </file>
 
@@ -7269,6 +7344,13 @@
   <p:clrMapOvr>
     <a:masterClrMapping/>
   </p:clrMapOvr>
+  <p:timing>
+    <p:tnLst>
+      <p:par>
+        <p:cTn id="1" dur="indefinite" restart="never" nodeType="tmRoot"/>
+      </p:par>
+    </p:tnLst>
+  </p:timing>
 </p:sld>
 </file>
 
@@ -7398,6 +7480,13 @@
   <p:clrMapOvr>
     <a:masterClrMapping/>
   </p:clrMapOvr>
+  <p:timing>
+    <p:tnLst>
+      <p:par>
+        <p:cTn id="1" dur="indefinite" restart="never" nodeType="tmRoot"/>
+      </p:par>
+    </p:tnLst>
+  </p:timing>
 </p:sld>
 </file>
 
@@ -7488,6 +7577,13 @@
   <p:clrMapOvr>
     <a:masterClrMapping/>
   </p:clrMapOvr>
+  <p:timing>
+    <p:tnLst>
+      <p:par>
+        <p:cTn id="1" dur="indefinite" restart="never" nodeType="tmRoot"/>
+      </p:par>
+    </p:tnLst>
+  </p:timing>
 </p:sld>
 </file>
 
@@ -7575,6 +7671,13 @@
   <p:clrMapOvr>
     <a:masterClrMapping/>
   </p:clrMapOvr>
+  <p:timing>
+    <p:tnLst>
+      <p:par>
+        <p:cTn id="1" dur="indefinite" restart="never" nodeType="tmRoot"/>
+      </p:par>
+    </p:tnLst>
+  </p:timing>
 </p:sld>
 </file>
 
@@ -7662,6 +7765,13 @@
   <p:clrMapOvr>
     <a:masterClrMapping/>
   </p:clrMapOvr>
+  <p:timing>
+    <p:tnLst>
+      <p:par>
+        <p:cTn id="1" dur="indefinite" restart="never" nodeType="tmRoot"/>
+      </p:par>
+    </p:tnLst>
+  </p:timing>
 </p:sld>
 </file>
 
@@ -7748,7 +7858,11 @@
           <a:p>
             <a:r>
               <a:rPr lang="en-US" dirty="0" smtClean="0"/>
-              <a:t>COLLECTOR DEMO (HERE OR LATER???)</a:t>
+              <a:t>COLLECTOR DEMO (</a:t>
+            </a:r>
+            <a:r>
+              <a:rPr lang="en-US" dirty="0" smtClean="0"/>
+              <a:t>HERE)</a:t>
             </a:r>
             <a:endParaRPr lang="en-US" dirty="0"/>
           </a:p>
@@ -7764,6 +7878,13 @@
   <p:clrMapOvr>
     <a:masterClrMapping/>
   </p:clrMapOvr>
+  <p:timing>
+    <p:tnLst>
+      <p:par>
+        <p:cTn id="1" dur="indefinite" restart="never" nodeType="tmRoot"/>
+      </p:par>
+    </p:tnLst>
+  </p:timing>
 </p:sld>
 </file>
 

</xml_diff>

<commit_message>
made changes to FieldDataCollection.pptx and started a new folder (DPU_pres) that has some images I will use in a presentation for TuGIS 2017.
</commit_message>
<xml_diff>
--- a/FieldDataCollection.pptx
+++ b/FieldDataCollection.pptx
@@ -204,7 +204,7 @@
           <a:p>
             <a:fld id="{99A8F4B2-2777-4C7D-9190-24BE9C783CF1}" type="datetimeFigureOut">
               <a:rPr lang="en-US" smtClean="0"/>
-              <a:t>12/12/2016</a:t>
+              <a:t>12/13/2016</a:t>
             </a:fld>
             <a:endParaRPr lang="en-US"/>
           </a:p>
@@ -522,7 +522,17 @@
             </a:r>
             <a:r>
               <a:rPr lang="en-US" baseline="0" dirty="0" smtClean="0"/>
-              <a:t> DPU (and Engineering) – Pat, Jay, Paul Harvey, Bobby? And Brian King.</a:t>
+              <a:t> DPU (and Engineering) – Pat, Jay, Paul Harvey, Bobby? And Brian King</a:t>
+            </a:r>
+            <a:r>
+              <a:rPr lang="en-US" baseline="0" dirty="0" smtClean="0"/>
+              <a:t>.</a:t>
+            </a:r>
+          </a:p>
+          <a:p>
+            <a:r>
+              <a:rPr lang="en-US" baseline="0" dirty="0" smtClean="0"/>
+              <a:t>Explain AGOL &amp; AGS and describe in broad strokes the others.</a:t>
             </a:r>
             <a:endParaRPr lang="en-US" dirty="0"/>
           </a:p>
@@ -712,7 +722,17 @@
             </a:r>
             <a:r>
               <a:rPr lang="en-US" baseline="0" dirty="0" smtClean="0"/>
-              <a:t> a pop (per user/per year) and a minimum of 5 additional users, it is a little bit restrictive.</a:t>
+              <a:t> a pop (per user/per year) and a minimum of 5 additional users, it is a little bit restrictive</a:t>
+            </a:r>
+            <a:r>
+              <a:rPr lang="en-US" baseline="0" dirty="0" smtClean="0"/>
+              <a:t>.</a:t>
+            </a:r>
+          </a:p>
+          <a:p>
+            <a:r>
+              <a:rPr lang="en-US" baseline="0" dirty="0" smtClean="0"/>
+              <a:t>I DON’T WANT TO TALK ABOUT THIS NOW. I WANT TO TALK ABOUT WHAT WE CAN DO WITH THE ONES WE HAVE!</a:t>
             </a:r>
             <a:endParaRPr lang="en-US" dirty="0"/>
           </a:p>
@@ -1054,19 +1074,7 @@
                 <a:ea typeface="+mn-ea"/>
                 <a:cs typeface="+mn-cs"/>
               </a:rPr>
-              <a:t> </a:t>
-            </a:r>
-            <a:r>
-              <a:rPr lang="en-US" sz="1200" kern="1200" dirty="0" smtClean="0">
-                <a:solidFill>
-                  <a:schemeClr val="tx1"/>
-                </a:solidFill>
-                <a:effectLst/>
-                <a:latin typeface="+mn-lt"/>
-                <a:ea typeface="+mn-ea"/>
-                <a:cs typeface="+mn-cs"/>
-              </a:rPr>
-              <a:t>deals with home inspections/smoke testing associated with county sewer (2 screenshots attached) and the other logs animal control incidents.</a:t>
+              <a:t> deals with home inspections/smoke testing associated with county sewer (2 screenshots attached) and the other logs animal control incidents.</a:t>
             </a:r>
           </a:p>
           <a:p>
@@ -1214,19 +1222,7 @@
                 <a:ea typeface="+mn-ea"/>
                 <a:cs typeface="+mn-cs"/>
               </a:rPr>
-              <a:t>They </a:t>
-            </a:r>
-            <a:r>
-              <a:rPr lang="en-US" sz="1200" kern="1200" dirty="0" smtClean="0">
-                <a:solidFill>
-                  <a:schemeClr val="tx1"/>
-                </a:solidFill>
-                <a:effectLst/>
-                <a:latin typeface="+mn-lt"/>
-                <a:ea typeface="+mn-ea"/>
-                <a:cs typeface="+mn-cs"/>
-              </a:rPr>
-              <a:t>are also working on a Workforce</a:t>
+              <a:t>They are also working on a Workforce</a:t>
             </a:r>
             <a:r>
               <a:rPr lang="en-US" sz="1200" kern="1200" baseline="0" dirty="0" smtClean="0">
@@ -1608,7 +1604,7 @@
             <a:fld id="{B61BEF0D-F0BB-DE4B-95CE-6DB70DBA9567}" type="datetimeFigureOut">
               <a:rPr lang="en-US" dirty="0"/>
               <a:pPr/>
-              <a:t>12/12/2016</a:t>
+              <a:t>12/13/2016</a:t>
             </a:fld>
             <a:endParaRPr lang="en-US" dirty="0"/>
           </a:p>
@@ -1939,7 +1935,7 @@
             <a:fld id="{B61BEF0D-F0BB-DE4B-95CE-6DB70DBA9567}" type="datetimeFigureOut">
               <a:rPr lang="en-US" dirty="0"/>
               <a:pPr/>
-              <a:t>12/12/2016</a:t>
+              <a:t>12/13/2016</a:t>
             </a:fld>
             <a:endParaRPr lang="en-US" dirty="0"/>
           </a:p>
@@ -2214,7 +2210,7 @@
             <a:fld id="{B61BEF0D-F0BB-DE4B-95CE-6DB70DBA9567}" type="datetimeFigureOut">
               <a:rPr lang="en-US" dirty="0"/>
               <a:pPr/>
-              <a:t>12/12/2016</a:t>
+              <a:t>12/13/2016</a:t>
             </a:fld>
             <a:endParaRPr lang="en-US" dirty="0"/>
           </a:p>
@@ -2779,7 +2775,7 @@
             <a:fld id="{B61BEF0D-F0BB-DE4B-95CE-6DB70DBA9567}" type="datetimeFigureOut">
               <a:rPr lang="en-US" dirty="0"/>
               <a:pPr/>
-              <a:t>12/12/2016</a:t>
+              <a:t>12/13/2016</a:t>
             </a:fld>
             <a:endParaRPr lang="en-US" dirty="0"/>
           </a:p>
@@ -3054,7 +3050,7 @@
             <a:fld id="{B61BEF0D-F0BB-DE4B-95CE-6DB70DBA9567}" type="datetimeFigureOut">
               <a:rPr lang="en-US" dirty="0"/>
               <a:pPr/>
-              <a:t>12/12/2016</a:t>
+              <a:t>12/13/2016</a:t>
             </a:fld>
             <a:endParaRPr lang="en-US" dirty="0"/>
           </a:p>
@@ -3613,7 +3609,7 @@
             <a:fld id="{B61BEF0D-F0BB-DE4B-95CE-6DB70DBA9567}" type="datetimeFigureOut">
               <a:rPr lang="en-US" dirty="0"/>
               <a:pPr/>
-              <a:t>12/12/2016</a:t>
+              <a:t>12/13/2016</a:t>
             </a:fld>
             <a:endParaRPr lang="en-US" dirty="0"/>
           </a:p>
@@ -3937,7 +3933,7 @@
             <a:fld id="{B61BEF0D-F0BB-DE4B-95CE-6DB70DBA9567}" type="datetimeFigureOut">
               <a:rPr lang="en-US" dirty="0"/>
               <a:pPr/>
-              <a:t>12/12/2016</a:t>
+              <a:t>12/13/2016</a:t>
             </a:fld>
             <a:endParaRPr lang="en-US" dirty="0"/>
           </a:p>
@@ -4111,7 +4107,7 @@
             <a:fld id="{B61BEF0D-F0BB-DE4B-95CE-6DB70DBA9567}" type="datetimeFigureOut">
               <a:rPr lang="en-US" dirty="0"/>
               <a:pPr/>
-              <a:t>12/12/2016</a:t>
+              <a:t>12/13/2016</a:t>
             </a:fld>
             <a:endParaRPr lang="en-US" dirty="0"/>
           </a:p>
@@ -4346,7 +4342,7 @@
             <a:fld id="{B61BEF0D-F0BB-DE4B-95CE-6DB70DBA9567}" type="datetimeFigureOut">
               <a:rPr lang="en-US" dirty="0"/>
               <a:pPr/>
-              <a:t>12/12/2016</a:t>
+              <a:t>12/13/2016</a:t>
             </a:fld>
             <a:endParaRPr lang="en-US" dirty="0"/>
           </a:p>
@@ -4543,7 +4539,7 @@
             <a:fld id="{B61BEF0D-F0BB-DE4B-95CE-6DB70DBA9567}" type="datetimeFigureOut">
               <a:rPr lang="en-US" dirty="0"/>
               <a:pPr/>
-              <a:t>12/12/2016</a:t>
+              <a:t>12/13/2016</a:t>
             </a:fld>
             <a:endParaRPr lang="en-US" dirty="0"/>
           </a:p>
@@ -4816,7 +4812,7 @@
             <a:fld id="{B61BEF0D-F0BB-DE4B-95CE-6DB70DBA9567}" type="datetimeFigureOut">
               <a:rPr lang="en-US" dirty="0"/>
               <a:pPr/>
-              <a:t>12/12/2016</a:t>
+              <a:t>12/13/2016</a:t>
             </a:fld>
             <a:endParaRPr lang="en-US" dirty="0"/>
           </a:p>
@@ -5079,7 +5075,7 @@
             <a:fld id="{B61BEF0D-F0BB-DE4B-95CE-6DB70DBA9567}" type="datetimeFigureOut">
               <a:rPr lang="en-US" dirty="0"/>
               <a:pPr/>
-              <a:t>12/12/2016</a:t>
+              <a:t>12/13/2016</a:t>
             </a:fld>
             <a:endParaRPr lang="en-US" dirty="0"/>
           </a:p>
@@ -5450,7 +5446,7 @@
             <a:fld id="{B61BEF0D-F0BB-DE4B-95CE-6DB70DBA9567}" type="datetimeFigureOut">
               <a:rPr lang="en-US" dirty="0"/>
               <a:pPr/>
-              <a:t>12/12/2016</a:t>
+              <a:t>12/13/2016</a:t>
             </a:fld>
             <a:endParaRPr lang="en-US" dirty="0"/>
           </a:p>
@@ -5595,7 +5591,7 @@
             <a:fld id="{B61BEF0D-F0BB-DE4B-95CE-6DB70DBA9567}" type="datetimeFigureOut">
               <a:rPr lang="en-US" dirty="0"/>
               <a:pPr/>
-              <a:t>12/12/2016</a:t>
+              <a:t>12/13/2016</a:t>
             </a:fld>
             <a:endParaRPr lang="en-US" dirty="0"/>
           </a:p>
@@ -5717,7 +5713,7 @@
             <a:fld id="{B61BEF0D-F0BB-DE4B-95CE-6DB70DBA9567}" type="datetimeFigureOut">
               <a:rPr lang="en-US" dirty="0"/>
               <a:pPr/>
-              <a:t>12/12/2016</a:t>
+              <a:t>12/13/2016</a:t>
             </a:fld>
             <a:endParaRPr lang="en-US" dirty="0"/>
           </a:p>
@@ -5999,7 +5995,7 @@
             <a:fld id="{B61BEF0D-F0BB-DE4B-95CE-6DB70DBA9567}" type="datetimeFigureOut">
               <a:rPr lang="en-US" dirty="0"/>
               <a:pPr/>
-              <a:t>12/12/2016</a:t>
+              <a:t>12/13/2016</a:t>
             </a:fld>
             <a:endParaRPr lang="en-US" dirty="0"/>
           </a:p>
@@ -6320,7 +6316,7 @@
             <a:fld id="{B61BEF0D-F0BB-DE4B-95CE-6DB70DBA9567}" type="datetimeFigureOut">
               <a:rPr lang="en-US" dirty="0"/>
               <a:pPr/>
-              <a:t>12/12/2016</a:t>
+              <a:t>12/13/2016</a:t>
             </a:fld>
             <a:endParaRPr lang="en-US" dirty="0"/>
           </a:p>
@@ -6531,7 +6527,7 @@
             <a:fld id="{B61BEF0D-F0BB-DE4B-95CE-6DB70DBA9567}" type="datetimeFigureOut">
               <a:rPr lang="en-US" dirty="0"/>
               <a:pPr/>
-              <a:t>12/12/2016</a:t>
+              <a:t>12/13/2016</a:t>
             </a:fld>
             <a:endParaRPr lang="en-US" dirty="0"/>
           </a:p>
@@ -7080,7 +7076,15 @@
           <a:p>
             <a:r>
               <a:rPr lang="en-US" dirty="0" smtClean="0"/>
-              <a:t>AGOL, Collector, Survey 123, </a:t>
+              <a:t>AGOL, </a:t>
+            </a:r>
+            <a:r>
+              <a:rPr lang="en-US" dirty="0" smtClean="0"/>
+              <a:t>AGS, Collector, Workforce, </a:t>
+            </a:r>
+            <a:r>
+              <a:rPr lang="en-US" dirty="0" smtClean="0"/>
+              <a:t>Survey 123, </a:t>
             </a:r>
             <a:r>
               <a:rPr lang="en-US" dirty="0" err="1" smtClean="0"/>
@@ -7852,17 +7856,18 @@
           <a:p>
             <a:r>
               <a:rPr lang="en-US" dirty="0" smtClean="0"/>
-              <a:t>Asset Mapping (not sure yet if this will be a demo or a discussion).</a:t>
-            </a:r>
-          </a:p>
-          <a:p>
+              <a:t>Asset Mapping </a:t>
+            </a:r>
             <a:r>
               <a:rPr lang="en-US" dirty="0" smtClean="0"/>
-              <a:t>COLLECTOR DEMO (</a:t>
-            </a:r>
+              <a:t>(Water &amp; Sewer) – Pipe Inspection Demo.</a:t>
+            </a:r>
+            <a:endParaRPr lang="en-US" dirty="0" smtClean="0"/>
+          </a:p>
+          <a:p>
             <a:r>
               <a:rPr lang="en-US" dirty="0" smtClean="0"/>
-              <a:t>HERE)</a:t>
+              <a:t>Collector Demo (Damage Assessment)</a:t>
             </a:r>
             <a:endParaRPr lang="en-US" dirty="0"/>
           </a:p>

</xml_diff>